<commit_message>
Power Point Draft 2
</commit_message>
<xml_diff>
--- a/Power Point/Group 3 Presentation.pptx
+++ b/Power Point/Group 3 Presentation.pptx
@@ -5,22 +5,28 @@
     <p:sldMasterId id="2147483648" r:id="rId1"/>
   </p:sldMasterIdLst>
   <p:notesMasterIdLst>
-    <p:notesMasterId r:id="rId15"/>
+    <p:notesMasterId r:id="rId21"/>
   </p:notesMasterIdLst>
   <p:sldIdLst>
     <p:sldId id="256" r:id="rId2"/>
-    <p:sldId id="257" r:id="rId3"/>
-    <p:sldId id="262" r:id="rId4"/>
-    <p:sldId id="264" r:id="rId5"/>
-    <p:sldId id="272" r:id="rId6"/>
-    <p:sldId id="263" r:id="rId7"/>
-    <p:sldId id="265" r:id="rId8"/>
-    <p:sldId id="270" r:id="rId9"/>
-    <p:sldId id="268" r:id="rId10"/>
-    <p:sldId id="266" r:id="rId11"/>
-    <p:sldId id="267" r:id="rId12"/>
-    <p:sldId id="274" r:id="rId13"/>
-    <p:sldId id="277" r:id="rId14"/>
+    <p:sldId id="278" r:id="rId3"/>
+    <p:sldId id="257" r:id="rId4"/>
+    <p:sldId id="262" r:id="rId5"/>
+    <p:sldId id="264" r:id="rId6"/>
+    <p:sldId id="272" r:id="rId7"/>
+    <p:sldId id="263" r:id="rId8"/>
+    <p:sldId id="265" r:id="rId9"/>
+    <p:sldId id="270" r:id="rId10"/>
+    <p:sldId id="268" r:id="rId11"/>
+    <p:sldId id="266" r:id="rId12"/>
+    <p:sldId id="267" r:id="rId13"/>
+    <p:sldId id="274" r:id="rId14"/>
+    <p:sldId id="277" r:id="rId15"/>
+    <p:sldId id="279" r:id="rId16"/>
+    <p:sldId id="280" r:id="rId17"/>
+    <p:sldId id="281" r:id="rId18"/>
+    <p:sldId id="282" r:id="rId19"/>
+    <p:sldId id="283" r:id="rId20"/>
   </p:sldIdLst>
   <p:sldSz cx="12192000" cy="6858000"/>
   <p:notesSz cx="6858000" cy="9144000"/>
@@ -130,7 +136,7 @@
 <file path=ppt/revisionInfo.xml><?xml version="1.0" encoding="utf-8"?>
 <p1510:revInfo xmlns:a="http://schemas.openxmlformats.org/drawingml/2006/main" xmlns:r="http://schemas.openxmlformats.org/officeDocument/2006/relationships" xmlns:p1510="http://schemas.microsoft.com/office/powerpoint/2015/10/main">
   <p1510:revLst>
-    <p1510:client id="{D5D3286D-0EA5-4F8E-83F9-8BA052C9894D}" v="374" dt="2024-12-05T08:09:16.935"/>
+    <p1510:client id="{D5D3286D-0EA5-4F8E-83F9-8BA052C9894D}" v="379" dt="2024-12-05T21:16:18.261"/>
   </p1510:revLst>
 </p1510:revInfo>
 </file>
@@ -140,18 +146,18 @@
   <pc:docChgLst>
     <pc:chgData name="Danny Sterling" userId="9c46ef9e127b3d0f" providerId="LiveId" clId="{D5D3286D-0EA5-4F8E-83F9-8BA052C9894D}"/>
     <pc:docChg chg="undo custSel addSld delSld modSld">
-      <pc:chgData name="Danny Sterling" userId="9c46ef9e127b3d0f" providerId="LiveId" clId="{D5D3286D-0EA5-4F8E-83F9-8BA052C9894D}" dt="2024-12-05T08:09:16.935" v="924" actId="20577"/>
+      <pc:chgData name="Danny Sterling" userId="9c46ef9e127b3d0f" providerId="LiveId" clId="{D5D3286D-0EA5-4F8E-83F9-8BA052C9894D}" dt="2024-12-05T21:19:54.929" v="3452"/>
       <pc:docMkLst>
         <pc:docMk/>
       </pc:docMkLst>
       <pc:sldChg chg="addSp modSp mod setBg addAnim">
-        <pc:chgData name="Danny Sterling" userId="9c46ef9e127b3d0f" providerId="LiveId" clId="{D5D3286D-0EA5-4F8E-83F9-8BA052C9894D}" dt="2024-12-05T08:09:16.935" v="924" actId="20577"/>
+        <pc:chgData name="Danny Sterling" userId="9c46ef9e127b3d0f" providerId="LiveId" clId="{D5D3286D-0EA5-4F8E-83F9-8BA052C9894D}" dt="2024-12-05T20:07:31.335" v="1155" actId="207"/>
         <pc:sldMkLst>
           <pc:docMk/>
           <pc:sldMk cId="1116409996" sldId="256"/>
         </pc:sldMkLst>
         <pc:spChg chg="mod">
-          <ac:chgData name="Danny Sterling" userId="9c46ef9e127b3d0f" providerId="LiveId" clId="{D5D3286D-0EA5-4F8E-83F9-8BA052C9894D}" dt="2024-12-05T08:09:16.935" v="924" actId="20577"/>
+          <ac:chgData name="Danny Sterling" userId="9c46ef9e127b3d0f" providerId="LiveId" clId="{D5D3286D-0EA5-4F8E-83F9-8BA052C9894D}" dt="2024-12-05T20:07:31.335" v="1155" actId="207"/>
           <ac:spMkLst>
             <pc:docMk/>
             <pc:sldMk cId="1116409996" sldId="256"/>
@@ -1694,6 +1700,319 @@
             <ac:picMk id="5" creationId="{F88A3C1E-0A81-5224-F9AA-11BE2AA1718D}"/>
           </ac:picMkLst>
         </pc:picChg>
+      </pc:sldChg>
+      <pc:sldChg chg="addSp modSp new mod setBg">
+        <pc:chgData name="Danny Sterling" userId="9c46ef9e127b3d0f" providerId="LiveId" clId="{D5D3286D-0EA5-4F8E-83F9-8BA052C9894D}" dt="2024-12-05T20:10:28.214" v="1281" actId="255"/>
+        <pc:sldMkLst>
+          <pc:docMk/>
+          <pc:sldMk cId="3283804103" sldId="278"/>
+        </pc:sldMkLst>
+        <pc:spChg chg="mod">
+          <ac:chgData name="Danny Sterling" userId="9c46ef9e127b3d0f" providerId="LiveId" clId="{D5D3286D-0EA5-4F8E-83F9-8BA052C9894D}" dt="2024-12-05T20:09:40.311" v="1275" actId="122"/>
+          <ac:spMkLst>
+            <pc:docMk/>
+            <pc:sldMk cId="3283804103" sldId="278"/>
+            <ac:spMk id="2" creationId="{E3C58C06-6893-5F45-35FE-C98F1E71B483}"/>
+          </ac:spMkLst>
+        </pc:spChg>
+        <pc:spChg chg="mod">
+          <ac:chgData name="Danny Sterling" userId="9c46ef9e127b3d0f" providerId="LiveId" clId="{D5D3286D-0EA5-4F8E-83F9-8BA052C9894D}" dt="2024-12-05T20:10:28.214" v="1281" actId="255"/>
+          <ac:spMkLst>
+            <pc:docMk/>
+            <pc:sldMk cId="3283804103" sldId="278"/>
+            <ac:spMk id="3" creationId="{A5239EAE-D936-1A91-1CA0-54BF1DD02FB1}"/>
+          </ac:spMkLst>
+        </pc:spChg>
+        <pc:spChg chg="add">
+          <ac:chgData name="Danny Sterling" userId="9c46ef9e127b3d0f" providerId="LiveId" clId="{D5D3286D-0EA5-4F8E-83F9-8BA052C9894D}" dt="2024-12-05T20:09:36.775" v="1274" actId="26606"/>
+          <ac:spMkLst>
+            <pc:docMk/>
+            <pc:sldMk cId="3283804103" sldId="278"/>
+            <ac:spMk id="9" creationId="{C0763A76-9F1C-4FC5-82B7-DD475DA461B2}"/>
+          </ac:spMkLst>
+        </pc:spChg>
+        <pc:spChg chg="add">
+          <ac:chgData name="Danny Sterling" userId="9c46ef9e127b3d0f" providerId="LiveId" clId="{D5D3286D-0EA5-4F8E-83F9-8BA052C9894D}" dt="2024-12-05T20:09:36.775" v="1274" actId="26606"/>
+          <ac:spMkLst>
+            <pc:docMk/>
+            <pc:sldMk cId="3283804103" sldId="278"/>
+            <ac:spMk id="11" creationId="{E81BF4F6-F2CF-4984-9D14-D6966D92F99F}"/>
+          </ac:spMkLst>
+        </pc:spChg>
+        <pc:picChg chg="add">
+          <ac:chgData name="Danny Sterling" userId="9c46ef9e127b3d0f" providerId="LiveId" clId="{D5D3286D-0EA5-4F8E-83F9-8BA052C9894D}" dt="2024-12-05T20:09:36.775" v="1274" actId="26606"/>
+          <ac:picMkLst>
+            <pc:docMk/>
+            <pc:sldMk cId="3283804103" sldId="278"/>
+            <ac:picMk id="5" creationId="{B9EBDA7A-0003-A4C8-6114-D28A7F26A735}"/>
+          </ac:picMkLst>
+        </pc:picChg>
+      </pc:sldChg>
+      <pc:sldChg chg="modSp new del mod">
+        <pc:chgData name="Danny Sterling" userId="9c46ef9e127b3d0f" providerId="LiveId" clId="{D5D3286D-0EA5-4F8E-83F9-8BA052C9894D}" dt="2024-12-05T20:12:41.045" v="1312" actId="2696"/>
+        <pc:sldMkLst>
+          <pc:docMk/>
+          <pc:sldMk cId="2968876543" sldId="279"/>
+        </pc:sldMkLst>
+        <pc:spChg chg="mod">
+          <ac:chgData name="Danny Sterling" userId="9c46ef9e127b3d0f" providerId="LiveId" clId="{D5D3286D-0EA5-4F8E-83F9-8BA052C9894D}" dt="2024-12-05T20:12:26.897" v="1311" actId="20577"/>
+          <ac:spMkLst>
+            <pc:docMk/>
+            <pc:sldMk cId="2968876543" sldId="279"/>
+            <ac:spMk id="2" creationId="{2DC2E2B4-EFC6-FBEA-A1F1-C98CDDFB61F7}"/>
+          </ac:spMkLst>
+        </pc:spChg>
+      </pc:sldChg>
+      <pc:sldChg chg="addSp modSp new mod setBg">
+        <pc:chgData name="Danny Sterling" userId="9c46ef9e127b3d0f" providerId="LiveId" clId="{D5D3286D-0EA5-4F8E-83F9-8BA052C9894D}" dt="2024-12-05T20:39:25.704" v="1811" actId="26606"/>
+        <pc:sldMkLst>
+          <pc:docMk/>
+          <pc:sldMk cId="3978058487" sldId="279"/>
+        </pc:sldMkLst>
+        <pc:spChg chg="mod">
+          <ac:chgData name="Danny Sterling" userId="9c46ef9e127b3d0f" providerId="LiveId" clId="{D5D3286D-0EA5-4F8E-83F9-8BA052C9894D}" dt="2024-12-05T20:39:25.704" v="1811" actId="26606"/>
+          <ac:spMkLst>
+            <pc:docMk/>
+            <pc:sldMk cId="3978058487" sldId="279"/>
+            <ac:spMk id="2" creationId="{6C0183B1-EBEF-FFA0-30A0-6559AA6BF281}"/>
+          </ac:spMkLst>
+        </pc:spChg>
+        <pc:spChg chg="mod">
+          <ac:chgData name="Danny Sterling" userId="9c46ef9e127b3d0f" providerId="LiveId" clId="{D5D3286D-0EA5-4F8E-83F9-8BA052C9894D}" dt="2024-12-05T20:39:25.704" v="1811" actId="26606"/>
+          <ac:spMkLst>
+            <pc:docMk/>
+            <pc:sldMk cId="3978058487" sldId="279"/>
+            <ac:spMk id="3" creationId="{EF67D2CE-626F-5471-A11D-B853C66E69AF}"/>
+          </ac:spMkLst>
+        </pc:spChg>
+        <pc:spChg chg="add">
+          <ac:chgData name="Danny Sterling" userId="9c46ef9e127b3d0f" providerId="LiveId" clId="{D5D3286D-0EA5-4F8E-83F9-8BA052C9894D}" dt="2024-12-05T20:39:25.704" v="1811" actId="26606"/>
+          <ac:spMkLst>
+            <pc:docMk/>
+            <pc:sldMk cId="3978058487" sldId="279"/>
+            <ac:spMk id="8" creationId="{907EF6B7-1338-4443-8C46-6A318D952DFD}"/>
+          </ac:spMkLst>
+        </pc:spChg>
+        <pc:spChg chg="add">
+          <ac:chgData name="Danny Sterling" userId="9c46ef9e127b3d0f" providerId="LiveId" clId="{D5D3286D-0EA5-4F8E-83F9-8BA052C9894D}" dt="2024-12-05T20:39:25.704" v="1811" actId="26606"/>
+          <ac:spMkLst>
+            <pc:docMk/>
+            <pc:sldMk cId="3978058487" sldId="279"/>
+            <ac:spMk id="10" creationId="{DAAE4CDD-124C-4DCF-9584-B6033B545DD5}"/>
+          </ac:spMkLst>
+        </pc:spChg>
+        <pc:spChg chg="add">
+          <ac:chgData name="Danny Sterling" userId="9c46ef9e127b3d0f" providerId="LiveId" clId="{D5D3286D-0EA5-4F8E-83F9-8BA052C9894D}" dt="2024-12-05T20:39:25.704" v="1811" actId="26606"/>
+          <ac:spMkLst>
+            <pc:docMk/>
+            <pc:sldMk cId="3978058487" sldId="279"/>
+            <ac:spMk id="12" creationId="{081E4A58-353D-44AE-B2FC-2A74E2E400F7}"/>
+          </ac:spMkLst>
+        </pc:spChg>
+      </pc:sldChg>
+      <pc:sldChg chg="addSp modSp new mod setBg">
+        <pc:chgData name="Danny Sterling" userId="9c46ef9e127b3d0f" providerId="LiveId" clId="{D5D3286D-0EA5-4F8E-83F9-8BA052C9894D}" dt="2024-12-05T20:58:16.404" v="2501" actId="313"/>
+        <pc:sldMkLst>
+          <pc:docMk/>
+          <pc:sldMk cId="2923692089" sldId="280"/>
+        </pc:sldMkLst>
+        <pc:spChg chg="mod">
+          <ac:chgData name="Danny Sterling" userId="9c46ef9e127b3d0f" providerId="LiveId" clId="{D5D3286D-0EA5-4F8E-83F9-8BA052C9894D}" dt="2024-12-05T20:45:32.017" v="2303" actId="26606"/>
+          <ac:spMkLst>
+            <pc:docMk/>
+            <pc:sldMk cId="2923692089" sldId="280"/>
+            <ac:spMk id="2" creationId="{D080F6F0-C912-013F-5B13-B82D5196037E}"/>
+          </ac:spMkLst>
+        </pc:spChg>
+        <pc:spChg chg="mod">
+          <ac:chgData name="Danny Sterling" userId="9c46ef9e127b3d0f" providerId="LiveId" clId="{D5D3286D-0EA5-4F8E-83F9-8BA052C9894D}" dt="2024-12-05T20:58:16.404" v="2501" actId="313"/>
+          <ac:spMkLst>
+            <pc:docMk/>
+            <pc:sldMk cId="2923692089" sldId="280"/>
+            <ac:spMk id="3" creationId="{7D8DE565-99BF-5819-B4F6-9F544414E533}"/>
+          </ac:spMkLst>
+        </pc:spChg>
+        <pc:spChg chg="add">
+          <ac:chgData name="Danny Sterling" userId="9c46ef9e127b3d0f" providerId="LiveId" clId="{D5D3286D-0EA5-4F8E-83F9-8BA052C9894D}" dt="2024-12-05T20:45:32.017" v="2303" actId="26606"/>
+          <ac:spMkLst>
+            <pc:docMk/>
+            <pc:sldMk cId="2923692089" sldId="280"/>
+            <ac:spMk id="8" creationId="{907EF6B7-1338-4443-8C46-6A318D952DFD}"/>
+          </ac:spMkLst>
+        </pc:spChg>
+        <pc:spChg chg="add">
+          <ac:chgData name="Danny Sterling" userId="9c46ef9e127b3d0f" providerId="LiveId" clId="{D5D3286D-0EA5-4F8E-83F9-8BA052C9894D}" dt="2024-12-05T20:45:32.017" v="2303" actId="26606"/>
+          <ac:spMkLst>
+            <pc:docMk/>
+            <pc:sldMk cId="2923692089" sldId="280"/>
+            <ac:spMk id="10" creationId="{DAAE4CDD-124C-4DCF-9584-B6033B545DD5}"/>
+          </ac:spMkLst>
+        </pc:spChg>
+        <pc:spChg chg="add">
+          <ac:chgData name="Danny Sterling" userId="9c46ef9e127b3d0f" providerId="LiveId" clId="{D5D3286D-0EA5-4F8E-83F9-8BA052C9894D}" dt="2024-12-05T20:45:32.017" v="2303" actId="26606"/>
+          <ac:spMkLst>
+            <pc:docMk/>
+            <pc:sldMk cId="2923692089" sldId="280"/>
+            <ac:spMk id="12" creationId="{081E4A58-353D-44AE-B2FC-2A74E2E400F7}"/>
+          </ac:spMkLst>
+        </pc:spChg>
+      </pc:sldChg>
+      <pc:sldChg chg="addSp modSp new mod setBg">
+        <pc:chgData name="Danny Sterling" userId="9c46ef9e127b3d0f" providerId="LiveId" clId="{D5D3286D-0EA5-4F8E-83F9-8BA052C9894D}" dt="2024-12-05T21:10:07.721" v="3197" actId="26606"/>
+        <pc:sldMkLst>
+          <pc:docMk/>
+          <pc:sldMk cId="533983762" sldId="281"/>
+        </pc:sldMkLst>
+        <pc:spChg chg="mod">
+          <ac:chgData name="Danny Sterling" userId="9c46ef9e127b3d0f" providerId="LiveId" clId="{D5D3286D-0EA5-4F8E-83F9-8BA052C9894D}" dt="2024-12-05T21:10:07.721" v="3197" actId="26606"/>
+          <ac:spMkLst>
+            <pc:docMk/>
+            <pc:sldMk cId="533983762" sldId="281"/>
+            <ac:spMk id="2" creationId="{70080C34-6CBD-C7B7-39CD-DF8015B11C6C}"/>
+          </ac:spMkLst>
+        </pc:spChg>
+        <pc:spChg chg="mod">
+          <ac:chgData name="Danny Sterling" userId="9c46ef9e127b3d0f" providerId="LiveId" clId="{D5D3286D-0EA5-4F8E-83F9-8BA052C9894D}" dt="2024-12-05T21:10:07.721" v="3197" actId="26606"/>
+          <ac:spMkLst>
+            <pc:docMk/>
+            <pc:sldMk cId="533983762" sldId="281"/>
+            <ac:spMk id="3" creationId="{229D7E99-C518-24CA-7F17-6F7C5F99159B}"/>
+          </ac:spMkLst>
+        </pc:spChg>
+        <pc:spChg chg="add">
+          <ac:chgData name="Danny Sterling" userId="9c46ef9e127b3d0f" providerId="LiveId" clId="{D5D3286D-0EA5-4F8E-83F9-8BA052C9894D}" dt="2024-12-05T21:10:07.721" v="3197" actId="26606"/>
+          <ac:spMkLst>
+            <pc:docMk/>
+            <pc:sldMk cId="533983762" sldId="281"/>
+            <ac:spMk id="8" creationId="{907EF6B7-1338-4443-8C46-6A318D952DFD}"/>
+          </ac:spMkLst>
+        </pc:spChg>
+        <pc:spChg chg="add">
+          <ac:chgData name="Danny Sterling" userId="9c46ef9e127b3d0f" providerId="LiveId" clId="{D5D3286D-0EA5-4F8E-83F9-8BA052C9894D}" dt="2024-12-05T21:10:07.721" v="3197" actId="26606"/>
+          <ac:spMkLst>
+            <pc:docMk/>
+            <pc:sldMk cId="533983762" sldId="281"/>
+            <ac:spMk id="10" creationId="{DAAE4CDD-124C-4DCF-9584-B6033B545DD5}"/>
+          </ac:spMkLst>
+        </pc:spChg>
+        <pc:spChg chg="add">
+          <ac:chgData name="Danny Sterling" userId="9c46ef9e127b3d0f" providerId="LiveId" clId="{D5D3286D-0EA5-4F8E-83F9-8BA052C9894D}" dt="2024-12-05T21:10:07.721" v="3197" actId="26606"/>
+          <ac:spMkLst>
+            <pc:docMk/>
+            <pc:sldMk cId="533983762" sldId="281"/>
+            <ac:spMk id="12" creationId="{081E4A58-353D-44AE-B2FC-2A74E2E400F7}"/>
+          </ac:spMkLst>
+        </pc:spChg>
+      </pc:sldChg>
+      <pc:sldChg chg="addSp modSp new mod setBg">
+        <pc:chgData name="Danny Sterling" userId="9c46ef9e127b3d0f" providerId="LiveId" clId="{D5D3286D-0EA5-4F8E-83F9-8BA052C9894D}" dt="2024-12-05T21:17:46.651" v="3449" actId="26606"/>
+        <pc:sldMkLst>
+          <pc:docMk/>
+          <pc:sldMk cId="3661908977" sldId="282"/>
+        </pc:sldMkLst>
+        <pc:spChg chg="mod">
+          <ac:chgData name="Danny Sterling" userId="9c46ef9e127b3d0f" providerId="LiveId" clId="{D5D3286D-0EA5-4F8E-83F9-8BA052C9894D}" dt="2024-12-05T21:17:46.651" v="3449" actId="26606"/>
+          <ac:spMkLst>
+            <pc:docMk/>
+            <pc:sldMk cId="3661908977" sldId="282"/>
+            <ac:spMk id="2" creationId="{587538E4-DC98-5E1E-271D-374AFEA60997}"/>
+          </ac:spMkLst>
+        </pc:spChg>
+        <pc:spChg chg="mod">
+          <ac:chgData name="Danny Sterling" userId="9c46ef9e127b3d0f" providerId="LiveId" clId="{D5D3286D-0EA5-4F8E-83F9-8BA052C9894D}" dt="2024-12-05T21:17:46.651" v="3449" actId="26606"/>
+          <ac:spMkLst>
+            <pc:docMk/>
+            <pc:sldMk cId="3661908977" sldId="282"/>
+            <ac:spMk id="3" creationId="{B6F98BE9-D13C-78FC-98A3-30642018F131}"/>
+          </ac:spMkLst>
+        </pc:spChg>
+        <pc:spChg chg="add">
+          <ac:chgData name="Danny Sterling" userId="9c46ef9e127b3d0f" providerId="LiveId" clId="{D5D3286D-0EA5-4F8E-83F9-8BA052C9894D}" dt="2024-12-05T21:17:46.651" v="3449" actId="26606"/>
+          <ac:spMkLst>
+            <pc:docMk/>
+            <pc:sldMk cId="3661908977" sldId="282"/>
+            <ac:spMk id="8" creationId="{907EF6B7-1338-4443-8C46-6A318D952DFD}"/>
+          </ac:spMkLst>
+        </pc:spChg>
+        <pc:spChg chg="add">
+          <ac:chgData name="Danny Sterling" userId="9c46ef9e127b3d0f" providerId="LiveId" clId="{D5D3286D-0EA5-4F8E-83F9-8BA052C9894D}" dt="2024-12-05T21:17:46.651" v="3449" actId="26606"/>
+          <ac:spMkLst>
+            <pc:docMk/>
+            <pc:sldMk cId="3661908977" sldId="282"/>
+            <ac:spMk id="10" creationId="{DAAE4CDD-124C-4DCF-9584-B6033B545DD5}"/>
+          </ac:spMkLst>
+        </pc:spChg>
+        <pc:spChg chg="add">
+          <ac:chgData name="Danny Sterling" userId="9c46ef9e127b3d0f" providerId="LiveId" clId="{D5D3286D-0EA5-4F8E-83F9-8BA052C9894D}" dt="2024-12-05T21:17:46.651" v="3449" actId="26606"/>
+          <ac:spMkLst>
+            <pc:docMk/>
+            <pc:sldMk cId="3661908977" sldId="282"/>
+            <ac:spMk id="12" creationId="{081E4A58-353D-44AE-B2FC-2A74E2E400F7}"/>
+          </ac:spMkLst>
+        </pc:spChg>
+      </pc:sldChg>
+      <pc:sldChg chg="addSp delSp modSp new mod setBg addAnim">
+        <pc:chgData name="Danny Sterling" userId="9c46ef9e127b3d0f" providerId="LiveId" clId="{D5D3286D-0EA5-4F8E-83F9-8BA052C9894D}" dt="2024-12-05T21:19:54.929" v="3452"/>
+        <pc:sldMkLst>
+          <pc:docMk/>
+          <pc:sldMk cId="3455206422" sldId="283"/>
+        </pc:sldMkLst>
+        <pc:spChg chg="mod">
+          <ac:chgData name="Danny Sterling" userId="9c46ef9e127b3d0f" providerId="LiveId" clId="{D5D3286D-0EA5-4F8E-83F9-8BA052C9894D}" dt="2024-12-05T21:19:54.928" v="3451" actId="26606"/>
+          <ac:spMkLst>
+            <pc:docMk/>
+            <pc:sldMk cId="3455206422" sldId="283"/>
+            <ac:spMk id="2" creationId="{A30E5892-0CE7-DBA4-A3D6-B26CD8E33CC2}"/>
+          </ac:spMkLst>
+        </pc:spChg>
+        <pc:spChg chg="del">
+          <ac:chgData name="Danny Sterling" userId="9c46ef9e127b3d0f" providerId="LiveId" clId="{D5D3286D-0EA5-4F8E-83F9-8BA052C9894D}" dt="2024-12-05T21:19:47.787" v="3450" actId="478"/>
+          <ac:spMkLst>
+            <pc:docMk/>
+            <pc:sldMk cId="3455206422" sldId="283"/>
+            <ac:spMk id="3" creationId="{98237B4E-1B99-E6CE-8BA2-46A24D98D6C2}"/>
+          </ac:spMkLst>
+        </pc:spChg>
+        <pc:spChg chg="add">
+          <ac:chgData name="Danny Sterling" userId="9c46ef9e127b3d0f" providerId="LiveId" clId="{D5D3286D-0EA5-4F8E-83F9-8BA052C9894D}" dt="2024-12-05T21:19:54.928" v="3451" actId="26606"/>
+          <ac:spMkLst>
+            <pc:docMk/>
+            <pc:sldMk cId="3455206422" sldId="283"/>
+            <ac:spMk id="7" creationId="{4E1BEB12-92AF-4445-98AD-4C7756E7C93B}"/>
+          </ac:spMkLst>
+        </pc:spChg>
+        <pc:spChg chg="add">
+          <ac:chgData name="Danny Sterling" userId="9c46ef9e127b3d0f" providerId="LiveId" clId="{D5D3286D-0EA5-4F8E-83F9-8BA052C9894D}" dt="2024-12-05T21:19:54.928" v="3451" actId="26606"/>
+          <ac:spMkLst>
+            <pc:docMk/>
+            <pc:sldMk cId="3455206422" sldId="283"/>
+            <ac:spMk id="9" creationId="{D0522C2C-7B5C-48A7-A969-03941E5D2E76}"/>
+          </ac:spMkLst>
+        </pc:spChg>
+        <pc:spChg chg="add">
+          <ac:chgData name="Danny Sterling" userId="9c46ef9e127b3d0f" providerId="LiveId" clId="{D5D3286D-0EA5-4F8E-83F9-8BA052C9894D}" dt="2024-12-05T21:19:54.928" v="3451" actId="26606"/>
+          <ac:spMkLst>
+            <pc:docMk/>
+            <pc:sldMk cId="3455206422" sldId="283"/>
+            <ac:spMk id="11" creationId="{9C682A1A-5B2D-4111-BBD6-620165633E5B}"/>
+          </ac:spMkLst>
+        </pc:spChg>
+        <pc:spChg chg="add">
+          <ac:chgData name="Danny Sterling" userId="9c46ef9e127b3d0f" providerId="LiveId" clId="{D5D3286D-0EA5-4F8E-83F9-8BA052C9894D}" dt="2024-12-05T21:19:54.928" v="3451" actId="26606"/>
+          <ac:spMkLst>
+            <pc:docMk/>
+            <pc:sldMk cId="3455206422" sldId="283"/>
+            <ac:spMk id="13" creationId="{D6EE29F2-D77F-4BD0-A20B-334D316A1C9D}"/>
+          </ac:spMkLst>
+        </pc:spChg>
+        <pc:spChg chg="add">
+          <ac:chgData name="Danny Sterling" userId="9c46ef9e127b3d0f" providerId="LiveId" clId="{D5D3286D-0EA5-4F8E-83F9-8BA052C9894D}" dt="2024-12-05T21:19:54.928" v="3451" actId="26606"/>
+          <ac:spMkLst>
+            <pc:docMk/>
+            <pc:sldMk cId="3455206422" sldId="283"/>
+            <ac:spMk id="15" creationId="{22D09ED2-868F-42C6-866E-F92E0CEF314F}"/>
+          </ac:spMkLst>
+        </pc:spChg>
       </pc:sldChg>
     </pc:docChg>
   </pc:docChgLst>
@@ -11410,7 +11729,7 @@
           <a:p>
             <a:fld id="{7B330A45-14A3-48FC-B6E5-6C0CEFC6270E}" type="slidenum">
               <a:rPr lang="en-US" smtClean="0"/>
-              <a:t>6</a:t>
+              <a:t>7</a:t>
             </a:fld>
             <a:endParaRPr lang="en-US"/>
           </a:p>
@@ -14776,28 +15095,17 @@
           </a:bodyPr>
           <a:lstStyle/>
           <a:p>
-            <a:pPr algn="l"/>
             <a:r>
               <a:rPr lang="en-US" sz="4000" dirty="0">
                 <a:solidFill>
-                  <a:srgbClr val="FFFFFF"/>
+                  <a:schemeClr val="bg1">
+                    <a:lumMod val="20000"/>
+                    <a:lumOff val="80000"/>
+                  </a:schemeClr>
                 </a:solidFill>
               </a:rPr>
-              <a:t>Video </a:t>
+              <a:t>Genre and Platform Sales Performance Across Regions from 1980-2005</a:t>
             </a:r>
-            <a:r>
-              <a:rPr lang="en-US" sz="4000">
-                <a:solidFill>
-                  <a:srgbClr val="FFFFFF"/>
-                </a:solidFill>
-              </a:rPr>
-              <a:t>Games Sales</a:t>
-            </a:r>
-            <a:endParaRPr lang="en-US" sz="4000" dirty="0">
-              <a:solidFill>
-                <a:srgbClr val="FFFFFF"/>
-              </a:solidFill>
-            </a:endParaRPr>
           </a:p>
         </p:txBody>
       </p:sp>
@@ -15222,6 +15530,295 @@
       </p:grpSpPr>
       <p:pic>
         <p:nvPicPr>
+          <p:cNvPr id="5" name="Picture 4" descr="A map of the world with different colored circles&#10;&#10;Description automatically generated">
+            <a:extLst>
+              <a:ext uri="{FF2B5EF4-FFF2-40B4-BE49-F238E27FC236}">
+                <a16:creationId xmlns:a16="http://schemas.microsoft.com/office/drawing/2014/main" id="{ACFEB7CC-F3BC-979B-955A-7429B5383098}"/>
+              </a:ext>
+            </a:extLst>
+          </p:cNvPr>
+          <p:cNvPicPr>
+            <a:picLocks noChangeAspect="1"/>
+          </p:cNvPicPr>
+          <p:nvPr/>
+        </p:nvPicPr>
+        <p:blipFill>
+          <a:blip r:embed="rId2">
+            <a:extLst>
+              <a:ext uri="{28A0092B-C50C-407E-A947-70E740481C1C}">
+                <a14:useLocalDpi xmlns:a14="http://schemas.microsoft.com/office/drawing/2010/main" val="0"/>
+              </a:ext>
+            </a:extLst>
+          </a:blip>
+          <a:srcRect b="6250"/>
+          <a:stretch/>
+        </p:blipFill>
+        <p:spPr>
+          <a:xfrm>
+            <a:off x="20" y="10"/>
+            <a:ext cx="12191980" cy="6857990"/>
+          </a:xfrm>
+          <a:prstGeom prst="rect">
+            <a:avLst/>
+          </a:prstGeom>
+        </p:spPr>
+      </p:pic>
+      <p:sp>
+        <p:nvSpPr>
+          <p:cNvPr id="10" name="Rectangle 9">
+            <a:extLst>
+              <a:ext uri="{FF2B5EF4-FFF2-40B4-BE49-F238E27FC236}">
+                <a16:creationId xmlns:a16="http://schemas.microsoft.com/office/drawing/2014/main" id="{37C89E4B-3C9F-44B9-8B86-D9E3D112D8EC}"/>
+              </a:ext>
+              <a:ext uri="{C183D7F6-B498-43B3-948B-1728B52AA6E4}">
+                <adec:decorative xmlns:adec="http://schemas.microsoft.com/office/drawing/2017/decorative" val="1"/>
+              </a:ext>
+            </a:extLst>
+          </p:cNvPr>
+          <p:cNvSpPr>
+            <a:spLocks noGrp="1" noRot="1" noChangeAspect="1" noMove="1" noResize="1" noEditPoints="1" noAdjustHandles="1" noChangeArrowheads="1" noChangeShapeType="1" noTextEdit="1"/>
+          </p:cNvSpPr>
+          <p:nvPr>
+            <p:extLst>
+              <p:ext uri="{386F3935-93C4-4BCD-93E2-E3B085C9AB24}">
+                <p16:designElem xmlns:p16="http://schemas.microsoft.com/office/powerpoint/2015/main" val="1"/>
+              </p:ext>
+            </p:extLst>
+          </p:nvPr>
+        </p:nvSpPr>
+        <p:spPr>
+          <a:xfrm>
+            <a:off x="0" y="5320142"/>
+            <a:ext cx="12192000" cy="736551"/>
+          </a:xfrm>
+          <a:prstGeom prst="rect">
+            <a:avLst/>
+          </a:prstGeom>
+          <a:solidFill>
+            <a:schemeClr val="bg1">
+              <a:alpha val="93000"/>
+            </a:schemeClr>
+          </a:solidFill>
+          <a:ln>
+            <a:noFill/>
+          </a:ln>
+        </p:spPr>
+        <p:style>
+          <a:lnRef idx="2">
+            <a:schemeClr val="accent1">
+              <a:shade val="50000"/>
+            </a:schemeClr>
+          </a:lnRef>
+          <a:fillRef idx="1">
+            <a:schemeClr val="accent1"/>
+          </a:fillRef>
+          <a:effectRef idx="0">
+            <a:schemeClr val="accent1"/>
+          </a:effectRef>
+          <a:fontRef idx="minor">
+            <a:schemeClr val="lt1"/>
+          </a:fontRef>
+        </p:style>
+        <p:txBody>
+          <a:bodyPr rtlCol="0" anchor="ctr"/>
+          <a:lstStyle/>
+          <a:p>
+            <a:pPr algn="ctr"/>
+            <a:endParaRPr lang="en-US"/>
+          </a:p>
+        </p:txBody>
+      </p:sp>
+      <p:sp>
+        <p:nvSpPr>
+          <p:cNvPr id="2" name="Title 1">
+            <a:extLst>
+              <a:ext uri="{FF2B5EF4-FFF2-40B4-BE49-F238E27FC236}">
+                <a16:creationId xmlns:a16="http://schemas.microsoft.com/office/drawing/2014/main" id="{4E504FAE-863F-774B-CAA7-525E98276E0F}"/>
+              </a:ext>
+            </a:extLst>
+          </p:cNvPr>
+          <p:cNvSpPr>
+            <a:spLocks noGrp="1"/>
+          </p:cNvSpPr>
+          <p:nvPr>
+            <p:ph type="title"/>
+          </p:nvPr>
+        </p:nvSpPr>
+        <p:spPr>
+          <a:xfrm>
+            <a:off x="523875" y="5317240"/>
+            <a:ext cx="11210925" cy="744836"/>
+          </a:xfrm>
+        </p:spPr>
+        <p:txBody>
+          <a:bodyPr vert="horz" lIns="91440" tIns="45720" rIns="91440" bIns="45720" rtlCol="0" anchor="ctr">
+            <a:normAutofit/>
+          </a:bodyPr>
+          <a:lstStyle/>
+          <a:p>
+            <a:pPr algn="ctr"/>
+            <a:r>
+              <a:rPr lang="en-US" sz="3600" dirty="0">
+                <a:solidFill>
+                  <a:schemeClr val="tx1">
+                    <a:lumMod val="85000"/>
+                    <a:lumOff val="15000"/>
+                  </a:schemeClr>
+                </a:solidFill>
+              </a:rPr>
+              <a:t>Action</a:t>
+            </a:r>
+          </a:p>
+        </p:txBody>
+      </p:sp>
+      <p:cxnSp>
+        <p:nvCxnSpPr>
+          <p:cNvPr id="12" name="Straight Connector 11">
+            <a:extLst>
+              <a:ext uri="{FF2B5EF4-FFF2-40B4-BE49-F238E27FC236}">
+                <a16:creationId xmlns:a16="http://schemas.microsoft.com/office/drawing/2014/main" id="{AA2EAA10-076F-46BD-8F0F-B9A2FB77A85C}"/>
+              </a:ext>
+              <a:ext uri="{C183D7F6-B498-43B3-948B-1728B52AA6E4}">
+                <adec:decorative xmlns:adec="http://schemas.microsoft.com/office/drawing/2017/decorative" val="1"/>
+              </a:ext>
+            </a:extLst>
+          </p:cNvPr>
+          <p:cNvCxnSpPr>
+            <a:cxnSpLocks noGrp="1" noRot="1" noChangeAspect="1" noMove="1" noResize="1" noEditPoints="1" noAdjustHandles="1" noChangeArrowheads="1" noChangeShapeType="1"/>
+          </p:cNvCxnSpPr>
+          <p:nvPr>
+            <p:extLst>
+              <p:ext uri="{386F3935-93C4-4BCD-93E2-E3B085C9AB24}">
+                <p16:designElem xmlns:p16="http://schemas.microsoft.com/office/powerpoint/2015/main" val="1"/>
+              </p:ext>
+            </p:extLst>
+          </p:nvPr>
+        </p:nvCxnSpPr>
+        <p:spPr>
+          <a:xfrm>
+            <a:off x="0" y="5241983"/>
+            <a:ext cx="12192000" cy="0"/>
+          </a:xfrm>
+          <a:prstGeom prst="line">
+            <a:avLst/>
+          </a:prstGeom>
+          <a:ln w="41275">
+            <a:solidFill>
+              <a:schemeClr val="bg1">
+                <a:alpha val="90000"/>
+              </a:schemeClr>
+            </a:solidFill>
+          </a:ln>
+        </p:spPr>
+        <p:style>
+          <a:lnRef idx="1">
+            <a:schemeClr val="accent1"/>
+          </a:lnRef>
+          <a:fillRef idx="0">
+            <a:schemeClr val="accent1"/>
+          </a:fillRef>
+          <a:effectRef idx="0">
+            <a:schemeClr val="accent1"/>
+          </a:effectRef>
+          <a:fontRef idx="minor">
+            <a:schemeClr val="tx1"/>
+          </a:fontRef>
+        </p:style>
+      </p:cxnSp>
+      <p:cxnSp>
+        <p:nvCxnSpPr>
+          <p:cNvPr id="14" name="Straight Connector 13">
+            <a:extLst>
+              <a:ext uri="{FF2B5EF4-FFF2-40B4-BE49-F238E27FC236}">
+                <a16:creationId xmlns:a16="http://schemas.microsoft.com/office/drawing/2014/main" id="{D891E407-403B-4764-86C9-33A56D3BCAA3}"/>
+              </a:ext>
+              <a:ext uri="{C183D7F6-B498-43B3-948B-1728B52AA6E4}">
+                <adec:decorative xmlns:adec="http://schemas.microsoft.com/office/drawing/2017/decorative" val="1"/>
+              </a:ext>
+            </a:extLst>
+          </p:cNvPr>
+          <p:cNvCxnSpPr>
+            <a:cxnSpLocks noGrp="1" noRot="1" noChangeAspect="1" noMove="1" noResize="1" noEditPoints="1" noAdjustHandles="1" noChangeArrowheads="1" noChangeShapeType="1"/>
+          </p:cNvCxnSpPr>
+          <p:nvPr>
+            <p:extLst>
+              <p:ext uri="{386F3935-93C4-4BCD-93E2-E3B085C9AB24}">
+                <p16:designElem xmlns:p16="http://schemas.microsoft.com/office/powerpoint/2015/main" val="1"/>
+              </p:ext>
+            </p:extLst>
+          </p:nvPr>
+        </p:nvCxnSpPr>
+        <p:spPr>
+          <a:xfrm>
+            <a:off x="0" y="6134852"/>
+            <a:ext cx="12192000" cy="0"/>
+          </a:xfrm>
+          <a:prstGeom prst="line">
+            <a:avLst/>
+          </a:prstGeom>
+          <a:ln w="41275">
+            <a:solidFill>
+              <a:schemeClr val="bg1">
+                <a:alpha val="90000"/>
+              </a:schemeClr>
+            </a:solidFill>
+          </a:ln>
+        </p:spPr>
+        <p:style>
+          <a:lnRef idx="1">
+            <a:schemeClr val="accent1"/>
+          </a:lnRef>
+          <a:fillRef idx="0">
+            <a:schemeClr val="accent1"/>
+          </a:fillRef>
+          <a:effectRef idx="0">
+            <a:schemeClr val="accent1"/>
+          </a:effectRef>
+          <a:fontRef idx="minor">
+            <a:schemeClr val="tx1"/>
+          </a:fontRef>
+        </p:style>
+      </p:cxnSp>
+    </p:spTree>
+    <p:extLst>
+      <p:ext uri="{BB962C8B-B14F-4D97-AF65-F5344CB8AC3E}">
+        <p14:creationId xmlns:p14="http://schemas.microsoft.com/office/powerpoint/2010/main" val="2864208696"/>
+      </p:ext>
+    </p:extLst>
+  </p:cSld>
+  <p:clrMapOvr>
+    <a:masterClrMapping/>
+  </p:clrMapOvr>
+</p:sld>
+</file>
+
+<file path=ppt/slides/slide11.xml><?xml version="1.0" encoding="utf-8"?>
+<p:sld xmlns:a="http://schemas.openxmlformats.org/drawingml/2006/main" xmlns:r="http://schemas.openxmlformats.org/officeDocument/2006/relationships" xmlns:p="http://schemas.openxmlformats.org/presentationml/2006/main">
+  <p:cSld>
+    <p:bg>
+      <p:bgPr>
+        <a:solidFill>
+          <a:schemeClr val="bg1"/>
+        </a:solidFill>
+        <a:effectLst/>
+      </p:bgPr>
+    </p:bg>
+    <p:spTree>
+      <p:nvGrpSpPr>
+        <p:cNvPr id="1" name=""/>
+        <p:cNvGrpSpPr/>
+        <p:nvPr/>
+      </p:nvGrpSpPr>
+      <p:grpSpPr>
+        <a:xfrm>
+          <a:off x="0" y="0"/>
+          <a:ext cx="0" cy="0"/>
+          <a:chOff x="0" y="0"/>
+          <a:chExt cx="0" cy="0"/>
+        </a:xfrm>
+      </p:grpSpPr>
+      <p:pic>
+        <p:nvPicPr>
           <p:cNvPr id="5" name="Picture 4" descr="A map of the world&#10;&#10;Description automatically generated">
             <a:extLst>
               <a:ext uri="{FF2B5EF4-FFF2-40B4-BE49-F238E27FC236}">
@@ -15484,7 +16081,7 @@
 </p:sld>
 </file>
 
-<file path=ppt/slides/slide11.xml><?xml version="1.0" encoding="utf-8"?>
+<file path=ppt/slides/slide12.xml><?xml version="1.0" encoding="utf-8"?>
 <p:sld xmlns:a="http://schemas.openxmlformats.org/drawingml/2006/main" xmlns:r="http://schemas.openxmlformats.org/officeDocument/2006/relationships" xmlns:p="http://schemas.openxmlformats.org/presentationml/2006/main">
   <p:cSld>
     <p:bg>
@@ -15773,7 +16370,7 @@
 </p:sld>
 </file>
 
-<file path=ppt/slides/slide12.xml><?xml version="1.0" encoding="utf-8"?>
+<file path=ppt/slides/slide13.xml><?xml version="1.0" encoding="utf-8"?>
 <p:sld xmlns:a="http://schemas.openxmlformats.org/drawingml/2006/main" xmlns:r="http://schemas.openxmlformats.org/officeDocument/2006/relationships" xmlns:p="http://schemas.openxmlformats.org/presentationml/2006/main">
   <p:cSld>
     <p:bg>
@@ -16608,7 +17205,7 @@
 </p:sld>
 </file>
 
-<file path=ppt/slides/slide13.xml><?xml version="1.0" encoding="utf-8"?>
+<file path=ppt/slides/slide14.xml><?xml version="1.0" encoding="utf-8"?>
 <p:sld xmlns:a="http://schemas.openxmlformats.org/drawingml/2006/main" xmlns:r="http://schemas.openxmlformats.org/officeDocument/2006/relationships" xmlns:p="http://schemas.openxmlformats.org/presentationml/2006/main">
   <p:cSld>
     <p:bg>
@@ -16748,7 +17345,2531 @@
 </p:sld>
 </file>
 
+<file path=ppt/slides/slide15.xml><?xml version="1.0" encoding="utf-8"?>
+<p:sld xmlns:a="http://schemas.openxmlformats.org/drawingml/2006/main" xmlns:r="http://schemas.openxmlformats.org/officeDocument/2006/relationships" xmlns:p="http://schemas.openxmlformats.org/presentationml/2006/main">
+  <p:cSld>
+    <p:bg>
+      <p:bgPr>
+        <a:solidFill>
+          <a:schemeClr val="bg1"/>
+        </a:solidFill>
+        <a:effectLst/>
+      </p:bgPr>
+    </p:bg>
+    <p:spTree>
+      <p:nvGrpSpPr>
+        <p:cNvPr id="1" name=""/>
+        <p:cNvGrpSpPr/>
+        <p:nvPr/>
+      </p:nvGrpSpPr>
+      <p:grpSpPr>
+        <a:xfrm>
+          <a:off x="0" y="0"/>
+          <a:ext cx="0" cy="0"/>
+          <a:chOff x="0" y="0"/>
+          <a:chExt cx="0" cy="0"/>
+        </a:xfrm>
+      </p:grpSpPr>
+      <p:sp useBgFill="1">
+        <p:nvSpPr>
+          <p:cNvPr id="8" name="Rectangle 7">
+            <a:extLst>
+              <a:ext uri="{FF2B5EF4-FFF2-40B4-BE49-F238E27FC236}">
+                <a16:creationId xmlns:a16="http://schemas.microsoft.com/office/drawing/2014/main" id="{907EF6B7-1338-4443-8C46-6A318D952DFD}"/>
+              </a:ext>
+              <a:ext uri="{C183D7F6-B498-43B3-948B-1728B52AA6E4}">
+                <adec:decorative xmlns:adec="http://schemas.microsoft.com/office/drawing/2017/decorative" val="1"/>
+              </a:ext>
+            </a:extLst>
+          </p:cNvPr>
+          <p:cNvSpPr>
+            <a:spLocks noGrp="1" noRot="1" noChangeAspect="1" noMove="1" noResize="1" noEditPoints="1" noAdjustHandles="1" noChangeArrowheads="1" noChangeShapeType="1" noTextEdit="1"/>
+          </p:cNvSpPr>
+          <p:nvPr>
+            <p:extLst>
+              <p:ext uri="{386F3935-93C4-4BCD-93E2-E3B085C9AB24}">
+                <p16:designElem xmlns:p16="http://schemas.microsoft.com/office/powerpoint/2015/main" val="1"/>
+              </p:ext>
+            </p:extLst>
+          </p:nvPr>
+        </p:nvSpPr>
+        <p:spPr>
+          <a:xfrm>
+            <a:off x="3048" y="0"/>
+            <a:ext cx="12188952" cy="6858000"/>
+          </a:xfrm>
+          <a:prstGeom prst="rect">
+            <a:avLst/>
+          </a:prstGeom>
+          <a:ln>
+            <a:noFill/>
+          </a:ln>
+        </p:spPr>
+        <p:style>
+          <a:lnRef idx="2">
+            <a:schemeClr val="accent1">
+              <a:shade val="50000"/>
+            </a:schemeClr>
+          </a:lnRef>
+          <a:fillRef idx="1">
+            <a:schemeClr val="accent1"/>
+          </a:fillRef>
+          <a:effectRef idx="0">
+            <a:schemeClr val="accent1"/>
+          </a:effectRef>
+          <a:fontRef idx="minor">
+            <a:schemeClr val="lt1"/>
+          </a:fontRef>
+        </p:style>
+        <p:txBody>
+          <a:bodyPr rtlCol="0" anchor="ctr"/>
+          <a:lstStyle/>
+          <a:p>
+            <a:pPr algn="ctr"/>
+            <a:endParaRPr lang="en-US"/>
+          </a:p>
+        </p:txBody>
+      </p:sp>
+      <p:sp>
+        <p:nvSpPr>
+          <p:cNvPr id="10" name="Freeform: Shape 9">
+            <a:extLst>
+              <a:ext uri="{FF2B5EF4-FFF2-40B4-BE49-F238E27FC236}">
+                <a16:creationId xmlns:a16="http://schemas.microsoft.com/office/drawing/2014/main" id="{DAAE4CDD-124C-4DCF-9584-B6033B545DD5}"/>
+              </a:ext>
+              <a:ext uri="{C183D7F6-B498-43B3-948B-1728B52AA6E4}">
+                <adec:decorative xmlns:adec="http://schemas.microsoft.com/office/drawing/2017/decorative" val="1"/>
+              </a:ext>
+            </a:extLst>
+          </p:cNvPr>
+          <p:cNvSpPr>
+            <a:spLocks noGrp="1" noRot="1" noChangeAspect="1" noMove="1" noResize="1" noEditPoints="1" noAdjustHandles="1" noChangeArrowheads="1" noChangeShapeType="1" noTextEdit="1"/>
+          </p:cNvSpPr>
+          <p:nvPr>
+            <p:extLst>
+              <p:ext uri="{386F3935-93C4-4BCD-93E2-E3B085C9AB24}">
+                <p16:designElem xmlns:p16="http://schemas.microsoft.com/office/powerpoint/2015/main" val="1"/>
+              </p:ext>
+            </p:extLst>
+          </p:nvPr>
+        </p:nvSpPr>
+        <p:spPr>
+          <a:xfrm>
+            <a:off x="1" y="0"/>
+            <a:ext cx="4167271" cy="6858000"/>
+          </a:xfrm>
+          <a:custGeom>
+            <a:avLst/>
+            <a:gdLst>
+              <a:gd name="connsiteX0" fmla="*/ 0 w 4167271"/>
+              <a:gd name="connsiteY0" fmla="*/ 0 h 6858000"/>
+              <a:gd name="connsiteX1" fmla="*/ 2259550 w 4167271"/>
+              <a:gd name="connsiteY1" fmla="*/ 0 h 6858000"/>
+              <a:gd name="connsiteX2" fmla="*/ 2387803 w 4167271"/>
+              <a:gd name="connsiteY2" fmla="*/ 82222 h 6858000"/>
+              <a:gd name="connsiteX3" fmla="*/ 4167271 w 4167271"/>
+              <a:gd name="connsiteY3" fmla="*/ 3429000 h 6858000"/>
+              <a:gd name="connsiteX4" fmla="*/ 2387803 w 4167271"/>
+              <a:gd name="connsiteY4" fmla="*/ 6775779 h 6858000"/>
+              <a:gd name="connsiteX5" fmla="*/ 2259550 w 4167271"/>
+              <a:gd name="connsiteY5" fmla="*/ 6858000 h 6858000"/>
+              <a:gd name="connsiteX6" fmla="*/ 0 w 4167271"/>
+              <a:gd name="connsiteY6" fmla="*/ 6858000 h 6858000"/>
+            </a:gdLst>
+            <a:ahLst/>
+            <a:cxnLst>
+              <a:cxn ang="0">
+                <a:pos x="connsiteX0" y="connsiteY0"/>
+              </a:cxn>
+              <a:cxn ang="0">
+                <a:pos x="connsiteX1" y="connsiteY1"/>
+              </a:cxn>
+              <a:cxn ang="0">
+                <a:pos x="connsiteX2" y="connsiteY2"/>
+              </a:cxn>
+              <a:cxn ang="0">
+                <a:pos x="connsiteX3" y="connsiteY3"/>
+              </a:cxn>
+              <a:cxn ang="0">
+                <a:pos x="connsiteX4" y="connsiteY4"/>
+              </a:cxn>
+              <a:cxn ang="0">
+                <a:pos x="connsiteX5" y="connsiteY5"/>
+              </a:cxn>
+              <a:cxn ang="0">
+                <a:pos x="connsiteX6" y="connsiteY6"/>
+              </a:cxn>
+            </a:cxnLst>
+            <a:rect l="l" t="t" r="r" b="b"/>
+            <a:pathLst>
+              <a:path w="4167271" h="6858000">
+                <a:moveTo>
+                  <a:pt x="0" y="0"/>
+                </a:moveTo>
+                <a:lnTo>
+                  <a:pt x="2259550" y="0"/>
+                </a:lnTo>
+                <a:lnTo>
+                  <a:pt x="2387803" y="82222"/>
+                </a:lnTo>
+                <a:cubicBezTo>
+                  <a:pt x="3461407" y="807534"/>
+                  <a:pt x="4167271" y="2035835"/>
+                  <a:pt x="4167271" y="3429000"/>
+                </a:cubicBezTo>
+                <a:cubicBezTo>
+                  <a:pt x="4167271" y="4822165"/>
+                  <a:pt x="3461407" y="6050467"/>
+                  <a:pt x="2387803" y="6775779"/>
+                </a:cubicBezTo>
+                <a:lnTo>
+                  <a:pt x="2259550" y="6858000"/>
+                </a:lnTo>
+                <a:lnTo>
+                  <a:pt x="0" y="6858000"/>
+                </a:lnTo>
+                <a:close/>
+              </a:path>
+            </a:pathLst>
+          </a:custGeom>
+          <a:solidFill>
+            <a:schemeClr val="accent2"/>
+          </a:solidFill>
+          <a:ln>
+            <a:noFill/>
+          </a:ln>
+        </p:spPr>
+        <p:style>
+          <a:lnRef idx="2">
+            <a:schemeClr val="accent1">
+              <a:shade val="50000"/>
+            </a:schemeClr>
+          </a:lnRef>
+          <a:fillRef idx="1">
+            <a:schemeClr val="accent1"/>
+          </a:fillRef>
+          <a:effectRef idx="0">
+            <a:schemeClr val="accent1"/>
+          </a:effectRef>
+          <a:fontRef idx="minor">
+            <a:schemeClr val="lt1"/>
+          </a:fontRef>
+        </p:style>
+        <p:txBody>
+          <a:bodyPr rtlCol="0" anchor="ctr"/>
+          <a:lstStyle/>
+          <a:p>
+            <a:pPr algn="ctr"/>
+            <a:endParaRPr lang="en-US"/>
+          </a:p>
+        </p:txBody>
+      </p:sp>
+      <p:sp>
+        <p:nvSpPr>
+          <p:cNvPr id="2" name="Title 1">
+            <a:extLst>
+              <a:ext uri="{FF2B5EF4-FFF2-40B4-BE49-F238E27FC236}">
+                <a16:creationId xmlns:a16="http://schemas.microsoft.com/office/drawing/2014/main" id="{6C0183B1-EBEF-FFA0-30A0-6559AA6BF281}"/>
+              </a:ext>
+            </a:extLst>
+          </p:cNvPr>
+          <p:cNvSpPr>
+            <a:spLocks noGrp="1"/>
+          </p:cNvSpPr>
+          <p:nvPr>
+            <p:ph type="title"/>
+          </p:nvPr>
+        </p:nvSpPr>
+        <p:spPr>
+          <a:xfrm>
+            <a:off x="686834" y="1153572"/>
+            <a:ext cx="3200400" cy="4461163"/>
+          </a:xfrm>
+        </p:spPr>
+        <p:txBody>
+          <a:bodyPr>
+            <a:normAutofit/>
+          </a:bodyPr>
+          <a:lstStyle/>
+          <a:p>
+            <a:r>
+              <a:rPr lang="en-US">
+                <a:solidFill>
+                  <a:srgbClr val="FFFFFF"/>
+                </a:solidFill>
+              </a:rPr>
+              <a:t>Call to Action</a:t>
+            </a:r>
+          </a:p>
+        </p:txBody>
+      </p:sp>
+      <p:sp>
+        <p:nvSpPr>
+          <p:cNvPr id="12" name="Arc 11">
+            <a:extLst>
+              <a:ext uri="{FF2B5EF4-FFF2-40B4-BE49-F238E27FC236}">
+                <a16:creationId xmlns:a16="http://schemas.microsoft.com/office/drawing/2014/main" id="{081E4A58-353D-44AE-B2FC-2A74E2E400F7}"/>
+              </a:ext>
+              <a:ext uri="{C183D7F6-B498-43B3-948B-1728B52AA6E4}">
+                <adec:decorative xmlns:adec="http://schemas.microsoft.com/office/drawing/2017/decorative" val="1"/>
+              </a:ext>
+            </a:extLst>
+          </p:cNvPr>
+          <p:cNvSpPr>
+            <a:spLocks noGrp="1" noRot="1" noChangeAspect="1" noMove="1" noResize="1" noEditPoints="1" noAdjustHandles="1" noChangeArrowheads="1" noChangeShapeType="1" noTextEdit="1"/>
+          </p:cNvSpPr>
+          <p:nvPr>
+            <p:extLst>
+              <p:ext uri="{386F3935-93C4-4BCD-93E2-E3B085C9AB24}">
+                <p16:designElem xmlns:p16="http://schemas.microsoft.com/office/powerpoint/2015/main" val="1"/>
+              </p:ext>
+            </p:extLst>
+          </p:nvPr>
+        </p:nvSpPr>
+        <p:spPr>
+          <a:xfrm flipV="1">
+            <a:off x="7550402" y="2455479"/>
+            <a:ext cx="4083433" cy="4083433"/>
+          </a:xfrm>
+          <a:prstGeom prst="arc">
+            <a:avLst/>
+          </a:prstGeom>
+          <a:ln w="127000" cap="rnd">
+            <a:solidFill>
+              <a:schemeClr val="accent4"/>
+            </a:solidFill>
+            <a:prstDash val="dash"/>
+          </a:ln>
+        </p:spPr>
+        <p:style>
+          <a:lnRef idx="1">
+            <a:schemeClr val="accent1"/>
+          </a:lnRef>
+          <a:fillRef idx="0">
+            <a:schemeClr val="accent1"/>
+          </a:fillRef>
+          <a:effectRef idx="0">
+            <a:schemeClr val="accent1"/>
+          </a:effectRef>
+          <a:fontRef idx="minor">
+            <a:schemeClr val="tx1"/>
+          </a:fontRef>
+        </p:style>
+        <p:txBody>
+          <a:bodyPr rtlCol="0" anchor="ctr"/>
+          <a:lstStyle/>
+          <a:p>
+            <a:pPr algn="ctr"/>
+            <a:endParaRPr lang="en-US" dirty="0"/>
+          </a:p>
+        </p:txBody>
+      </p:sp>
+      <p:sp>
+        <p:nvSpPr>
+          <p:cNvPr id="3" name="Content Placeholder 2">
+            <a:extLst>
+              <a:ext uri="{FF2B5EF4-FFF2-40B4-BE49-F238E27FC236}">
+                <a16:creationId xmlns:a16="http://schemas.microsoft.com/office/drawing/2014/main" id="{EF67D2CE-626F-5471-A11D-B853C66E69AF}"/>
+              </a:ext>
+            </a:extLst>
+          </p:cNvPr>
+          <p:cNvSpPr>
+            <a:spLocks noGrp="1"/>
+          </p:cNvSpPr>
+          <p:nvPr>
+            <p:ph idx="1"/>
+          </p:nvPr>
+        </p:nvSpPr>
+        <p:spPr>
+          <a:xfrm>
+            <a:off x="4447308" y="591344"/>
+            <a:ext cx="6906491" cy="5585619"/>
+          </a:xfrm>
+        </p:spPr>
+        <p:txBody>
+          <a:bodyPr anchor="ctr">
+            <a:normAutofit/>
+          </a:bodyPr>
+          <a:lstStyle/>
+          <a:p>
+            <a:r>
+              <a:rPr lang="en-US" dirty="0"/>
+              <a:t>Based of our Analysis of the Data Set we have concluded that if a new game were to included elements of Action, Sports, and Shooter games, while also ensuring that they focus marketing on North America and Europe, that game would have the best foundation for success.</a:t>
+            </a:r>
+          </a:p>
+        </p:txBody>
+      </p:sp>
+    </p:spTree>
+    <p:extLst>
+      <p:ext uri="{BB962C8B-B14F-4D97-AF65-F5344CB8AC3E}">
+        <p14:creationId xmlns:p14="http://schemas.microsoft.com/office/powerpoint/2010/main" val="3978058487"/>
+      </p:ext>
+    </p:extLst>
+  </p:cSld>
+  <p:clrMapOvr>
+    <a:masterClrMapping/>
+  </p:clrMapOvr>
+</p:sld>
+</file>
+
+<file path=ppt/slides/slide16.xml><?xml version="1.0" encoding="utf-8"?>
+<p:sld xmlns:a="http://schemas.openxmlformats.org/drawingml/2006/main" xmlns:r="http://schemas.openxmlformats.org/officeDocument/2006/relationships" xmlns:p="http://schemas.openxmlformats.org/presentationml/2006/main">
+  <p:cSld>
+    <p:bg>
+      <p:bgPr>
+        <a:solidFill>
+          <a:schemeClr val="bg1"/>
+        </a:solidFill>
+        <a:effectLst/>
+      </p:bgPr>
+    </p:bg>
+    <p:spTree>
+      <p:nvGrpSpPr>
+        <p:cNvPr id="1" name=""/>
+        <p:cNvGrpSpPr/>
+        <p:nvPr/>
+      </p:nvGrpSpPr>
+      <p:grpSpPr>
+        <a:xfrm>
+          <a:off x="0" y="0"/>
+          <a:ext cx="0" cy="0"/>
+          <a:chOff x="0" y="0"/>
+          <a:chExt cx="0" cy="0"/>
+        </a:xfrm>
+      </p:grpSpPr>
+      <p:sp useBgFill="1">
+        <p:nvSpPr>
+          <p:cNvPr id="8" name="Rectangle 7">
+            <a:extLst>
+              <a:ext uri="{FF2B5EF4-FFF2-40B4-BE49-F238E27FC236}">
+                <a16:creationId xmlns:a16="http://schemas.microsoft.com/office/drawing/2014/main" id="{907EF6B7-1338-4443-8C46-6A318D952DFD}"/>
+              </a:ext>
+              <a:ext uri="{C183D7F6-B498-43B3-948B-1728B52AA6E4}">
+                <adec:decorative xmlns:adec="http://schemas.microsoft.com/office/drawing/2017/decorative" val="1"/>
+              </a:ext>
+            </a:extLst>
+          </p:cNvPr>
+          <p:cNvSpPr>
+            <a:spLocks noGrp="1" noRot="1" noChangeAspect="1" noMove="1" noResize="1" noEditPoints="1" noAdjustHandles="1" noChangeArrowheads="1" noChangeShapeType="1" noTextEdit="1"/>
+          </p:cNvSpPr>
+          <p:nvPr>
+            <p:extLst>
+              <p:ext uri="{386F3935-93C4-4BCD-93E2-E3B085C9AB24}">
+                <p16:designElem xmlns:p16="http://schemas.microsoft.com/office/powerpoint/2015/main" val="1"/>
+              </p:ext>
+            </p:extLst>
+          </p:nvPr>
+        </p:nvSpPr>
+        <p:spPr>
+          <a:xfrm>
+            <a:off x="3048" y="0"/>
+            <a:ext cx="12188952" cy="6858000"/>
+          </a:xfrm>
+          <a:prstGeom prst="rect">
+            <a:avLst/>
+          </a:prstGeom>
+          <a:ln>
+            <a:noFill/>
+          </a:ln>
+        </p:spPr>
+        <p:style>
+          <a:lnRef idx="2">
+            <a:schemeClr val="accent1">
+              <a:shade val="50000"/>
+            </a:schemeClr>
+          </a:lnRef>
+          <a:fillRef idx="1">
+            <a:schemeClr val="accent1"/>
+          </a:fillRef>
+          <a:effectRef idx="0">
+            <a:schemeClr val="accent1"/>
+          </a:effectRef>
+          <a:fontRef idx="minor">
+            <a:schemeClr val="lt1"/>
+          </a:fontRef>
+        </p:style>
+        <p:txBody>
+          <a:bodyPr rtlCol="0" anchor="ctr"/>
+          <a:lstStyle/>
+          <a:p>
+            <a:pPr algn="ctr"/>
+            <a:endParaRPr lang="en-US"/>
+          </a:p>
+        </p:txBody>
+      </p:sp>
+      <p:sp>
+        <p:nvSpPr>
+          <p:cNvPr id="10" name="Freeform: Shape 9">
+            <a:extLst>
+              <a:ext uri="{FF2B5EF4-FFF2-40B4-BE49-F238E27FC236}">
+                <a16:creationId xmlns:a16="http://schemas.microsoft.com/office/drawing/2014/main" id="{DAAE4CDD-124C-4DCF-9584-B6033B545DD5}"/>
+              </a:ext>
+              <a:ext uri="{C183D7F6-B498-43B3-948B-1728B52AA6E4}">
+                <adec:decorative xmlns:adec="http://schemas.microsoft.com/office/drawing/2017/decorative" val="1"/>
+              </a:ext>
+            </a:extLst>
+          </p:cNvPr>
+          <p:cNvSpPr>
+            <a:spLocks noGrp="1" noRot="1" noChangeAspect="1" noMove="1" noResize="1" noEditPoints="1" noAdjustHandles="1" noChangeArrowheads="1" noChangeShapeType="1" noTextEdit="1"/>
+          </p:cNvSpPr>
+          <p:nvPr>
+            <p:extLst>
+              <p:ext uri="{386F3935-93C4-4BCD-93E2-E3B085C9AB24}">
+                <p16:designElem xmlns:p16="http://schemas.microsoft.com/office/powerpoint/2015/main" val="1"/>
+              </p:ext>
+            </p:extLst>
+          </p:nvPr>
+        </p:nvSpPr>
+        <p:spPr>
+          <a:xfrm>
+            <a:off x="1" y="0"/>
+            <a:ext cx="4167271" cy="6858000"/>
+          </a:xfrm>
+          <a:custGeom>
+            <a:avLst/>
+            <a:gdLst>
+              <a:gd name="connsiteX0" fmla="*/ 0 w 4167271"/>
+              <a:gd name="connsiteY0" fmla="*/ 0 h 6858000"/>
+              <a:gd name="connsiteX1" fmla="*/ 2259550 w 4167271"/>
+              <a:gd name="connsiteY1" fmla="*/ 0 h 6858000"/>
+              <a:gd name="connsiteX2" fmla="*/ 2387803 w 4167271"/>
+              <a:gd name="connsiteY2" fmla="*/ 82222 h 6858000"/>
+              <a:gd name="connsiteX3" fmla="*/ 4167271 w 4167271"/>
+              <a:gd name="connsiteY3" fmla="*/ 3429000 h 6858000"/>
+              <a:gd name="connsiteX4" fmla="*/ 2387803 w 4167271"/>
+              <a:gd name="connsiteY4" fmla="*/ 6775779 h 6858000"/>
+              <a:gd name="connsiteX5" fmla="*/ 2259550 w 4167271"/>
+              <a:gd name="connsiteY5" fmla="*/ 6858000 h 6858000"/>
+              <a:gd name="connsiteX6" fmla="*/ 0 w 4167271"/>
+              <a:gd name="connsiteY6" fmla="*/ 6858000 h 6858000"/>
+            </a:gdLst>
+            <a:ahLst/>
+            <a:cxnLst>
+              <a:cxn ang="0">
+                <a:pos x="connsiteX0" y="connsiteY0"/>
+              </a:cxn>
+              <a:cxn ang="0">
+                <a:pos x="connsiteX1" y="connsiteY1"/>
+              </a:cxn>
+              <a:cxn ang="0">
+                <a:pos x="connsiteX2" y="connsiteY2"/>
+              </a:cxn>
+              <a:cxn ang="0">
+                <a:pos x="connsiteX3" y="connsiteY3"/>
+              </a:cxn>
+              <a:cxn ang="0">
+                <a:pos x="connsiteX4" y="connsiteY4"/>
+              </a:cxn>
+              <a:cxn ang="0">
+                <a:pos x="connsiteX5" y="connsiteY5"/>
+              </a:cxn>
+              <a:cxn ang="0">
+                <a:pos x="connsiteX6" y="connsiteY6"/>
+              </a:cxn>
+            </a:cxnLst>
+            <a:rect l="l" t="t" r="r" b="b"/>
+            <a:pathLst>
+              <a:path w="4167271" h="6858000">
+                <a:moveTo>
+                  <a:pt x="0" y="0"/>
+                </a:moveTo>
+                <a:lnTo>
+                  <a:pt x="2259550" y="0"/>
+                </a:lnTo>
+                <a:lnTo>
+                  <a:pt x="2387803" y="82222"/>
+                </a:lnTo>
+                <a:cubicBezTo>
+                  <a:pt x="3461407" y="807534"/>
+                  <a:pt x="4167271" y="2035835"/>
+                  <a:pt x="4167271" y="3429000"/>
+                </a:cubicBezTo>
+                <a:cubicBezTo>
+                  <a:pt x="4167271" y="4822165"/>
+                  <a:pt x="3461407" y="6050467"/>
+                  <a:pt x="2387803" y="6775779"/>
+                </a:cubicBezTo>
+                <a:lnTo>
+                  <a:pt x="2259550" y="6858000"/>
+                </a:lnTo>
+                <a:lnTo>
+                  <a:pt x="0" y="6858000"/>
+                </a:lnTo>
+                <a:close/>
+              </a:path>
+            </a:pathLst>
+          </a:custGeom>
+          <a:solidFill>
+            <a:schemeClr val="accent2"/>
+          </a:solidFill>
+          <a:ln>
+            <a:noFill/>
+          </a:ln>
+        </p:spPr>
+        <p:style>
+          <a:lnRef idx="2">
+            <a:schemeClr val="accent1">
+              <a:shade val="50000"/>
+            </a:schemeClr>
+          </a:lnRef>
+          <a:fillRef idx="1">
+            <a:schemeClr val="accent1"/>
+          </a:fillRef>
+          <a:effectRef idx="0">
+            <a:schemeClr val="accent1"/>
+          </a:effectRef>
+          <a:fontRef idx="minor">
+            <a:schemeClr val="lt1"/>
+          </a:fontRef>
+        </p:style>
+        <p:txBody>
+          <a:bodyPr rtlCol="0" anchor="ctr"/>
+          <a:lstStyle/>
+          <a:p>
+            <a:pPr algn="ctr"/>
+            <a:endParaRPr lang="en-US"/>
+          </a:p>
+        </p:txBody>
+      </p:sp>
+      <p:sp>
+        <p:nvSpPr>
+          <p:cNvPr id="2" name="Title 1">
+            <a:extLst>
+              <a:ext uri="{FF2B5EF4-FFF2-40B4-BE49-F238E27FC236}">
+                <a16:creationId xmlns:a16="http://schemas.microsoft.com/office/drawing/2014/main" id="{D080F6F0-C912-013F-5B13-B82D5196037E}"/>
+              </a:ext>
+            </a:extLst>
+          </p:cNvPr>
+          <p:cNvSpPr>
+            <a:spLocks noGrp="1"/>
+          </p:cNvSpPr>
+          <p:nvPr>
+            <p:ph type="title"/>
+          </p:nvPr>
+        </p:nvSpPr>
+        <p:spPr>
+          <a:xfrm>
+            <a:off x="686834" y="1153572"/>
+            <a:ext cx="3200400" cy="4461163"/>
+          </a:xfrm>
+        </p:spPr>
+        <p:txBody>
+          <a:bodyPr>
+            <a:normAutofit/>
+          </a:bodyPr>
+          <a:lstStyle/>
+          <a:p>
+            <a:r>
+              <a:rPr lang="en-US">
+                <a:solidFill>
+                  <a:srgbClr val="FFFFFF"/>
+                </a:solidFill>
+              </a:rPr>
+              <a:t>Bias and Limitation</a:t>
+            </a:r>
+          </a:p>
+        </p:txBody>
+      </p:sp>
+      <p:sp>
+        <p:nvSpPr>
+          <p:cNvPr id="12" name="Arc 11">
+            <a:extLst>
+              <a:ext uri="{FF2B5EF4-FFF2-40B4-BE49-F238E27FC236}">
+                <a16:creationId xmlns:a16="http://schemas.microsoft.com/office/drawing/2014/main" id="{081E4A58-353D-44AE-B2FC-2A74E2E400F7}"/>
+              </a:ext>
+              <a:ext uri="{C183D7F6-B498-43B3-948B-1728B52AA6E4}">
+                <adec:decorative xmlns:adec="http://schemas.microsoft.com/office/drawing/2017/decorative" val="1"/>
+              </a:ext>
+            </a:extLst>
+          </p:cNvPr>
+          <p:cNvSpPr>
+            <a:spLocks noGrp="1" noRot="1" noChangeAspect="1" noMove="1" noResize="1" noEditPoints="1" noAdjustHandles="1" noChangeArrowheads="1" noChangeShapeType="1" noTextEdit="1"/>
+          </p:cNvSpPr>
+          <p:nvPr>
+            <p:extLst>
+              <p:ext uri="{386F3935-93C4-4BCD-93E2-E3B085C9AB24}">
+                <p16:designElem xmlns:p16="http://schemas.microsoft.com/office/powerpoint/2015/main" val="1"/>
+              </p:ext>
+            </p:extLst>
+          </p:nvPr>
+        </p:nvSpPr>
+        <p:spPr>
+          <a:xfrm flipV="1">
+            <a:off x="7550402" y="2455479"/>
+            <a:ext cx="4083433" cy="4083433"/>
+          </a:xfrm>
+          <a:prstGeom prst="arc">
+            <a:avLst/>
+          </a:prstGeom>
+          <a:ln w="127000" cap="rnd">
+            <a:solidFill>
+              <a:schemeClr val="accent4"/>
+            </a:solidFill>
+            <a:prstDash val="dash"/>
+          </a:ln>
+        </p:spPr>
+        <p:style>
+          <a:lnRef idx="1">
+            <a:schemeClr val="accent1"/>
+          </a:lnRef>
+          <a:fillRef idx="0">
+            <a:schemeClr val="accent1"/>
+          </a:fillRef>
+          <a:effectRef idx="0">
+            <a:schemeClr val="accent1"/>
+          </a:effectRef>
+          <a:fontRef idx="minor">
+            <a:schemeClr val="tx1"/>
+          </a:fontRef>
+        </p:style>
+        <p:txBody>
+          <a:bodyPr rtlCol="0" anchor="ctr"/>
+          <a:lstStyle/>
+          <a:p>
+            <a:pPr algn="ctr"/>
+            <a:endParaRPr lang="en-US" dirty="0"/>
+          </a:p>
+        </p:txBody>
+      </p:sp>
+      <p:sp>
+        <p:nvSpPr>
+          <p:cNvPr id="3" name="Content Placeholder 2">
+            <a:extLst>
+              <a:ext uri="{FF2B5EF4-FFF2-40B4-BE49-F238E27FC236}">
+                <a16:creationId xmlns:a16="http://schemas.microsoft.com/office/drawing/2014/main" id="{7D8DE565-99BF-5819-B4F6-9F544414E533}"/>
+              </a:ext>
+            </a:extLst>
+          </p:cNvPr>
+          <p:cNvSpPr>
+            <a:spLocks noGrp="1"/>
+          </p:cNvSpPr>
+          <p:nvPr>
+            <p:ph idx="1"/>
+          </p:nvPr>
+        </p:nvSpPr>
+        <p:spPr>
+          <a:xfrm>
+            <a:off x="4447308" y="591344"/>
+            <a:ext cx="6906491" cy="5585619"/>
+          </a:xfrm>
+        </p:spPr>
+        <p:txBody>
+          <a:bodyPr anchor="ctr">
+            <a:normAutofit/>
+          </a:bodyPr>
+          <a:lstStyle/>
+          <a:p>
+            <a:r>
+              <a:rPr lang="en-US" dirty="0"/>
+              <a:t>The major bias of our data set is platforms. Certain games could have likely found more success had they been made available on other Platforms. This is the case with Japan's Platform Sales.</a:t>
+            </a:r>
+          </a:p>
+          <a:p>
+            <a:r>
+              <a:rPr lang="en-US" dirty="0"/>
+              <a:t>The major limitation to our data set is not having indications for a game being part of a long running series. This would heavily affect the popularity of a release.</a:t>
+            </a:r>
+          </a:p>
+        </p:txBody>
+      </p:sp>
+    </p:spTree>
+    <p:extLst>
+      <p:ext uri="{BB962C8B-B14F-4D97-AF65-F5344CB8AC3E}">
+        <p14:creationId xmlns:p14="http://schemas.microsoft.com/office/powerpoint/2010/main" val="2923692089"/>
+      </p:ext>
+    </p:extLst>
+  </p:cSld>
+  <p:clrMapOvr>
+    <a:masterClrMapping/>
+  </p:clrMapOvr>
+</p:sld>
+</file>
+
+<file path=ppt/slides/slide17.xml><?xml version="1.0" encoding="utf-8"?>
+<p:sld xmlns:a="http://schemas.openxmlformats.org/drawingml/2006/main" xmlns:r="http://schemas.openxmlformats.org/officeDocument/2006/relationships" xmlns:p="http://schemas.openxmlformats.org/presentationml/2006/main">
+  <p:cSld>
+    <p:bg>
+      <p:bgPr>
+        <a:solidFill>
+          <a:schemeClr val="bg1"/>
+        </a:solidFill>
+        <a:effectLst/>
+      </p:bgPr>
+    </p:bg>
+    <p:spTree>
+      <p:nvGrpSpPr>
+        <p:cNvPr id="1" name=""/>
+        <p:cNvGrpSpPr/>
+        <p:nvPr/>
+      </p:nvGrpSpPr>
+      <p:grpSpPr>
+        <a:xfrm>
+          <a:off x="0" y="0"/>
+          <a:ext cx="0" cy="0"/>
+          <a:chOff x="0" y="0"/>
+          <a:chExt cx="0" cy="0"/>
+        </a:xfrm>
+      </p:grpSpPr>
+      <p:sp useBgFill="1">
+        <p:nvSpPr>
+          <p:cNvPr id="8" name="Rectangle 7">
+            <a:extLst>
+              <a:ext uri="{FF2B5EF4-FFF2-40B4-BE49-F238E27FC236}">
+                <a16:creationId xmlns:a16="http://schemas.microsoft.com/office/drawing/2014/main" id="{907EF6B7-1338-4443-8C46-6A318D952DFD}"/>
+              </a:ext>
+              <a:ext uri="{C183D7F6-B498-43B3-948B-1728B52AA6E4}">
+                <adec:decorative xmlns:adec="http://schemas.microsoft.com/office/drawing/2017/decorative" val="1"/>
+              </a:ext>
+            </a:extLst>
+          </p:cNvPr>
+          <p:cNvSpPr>
+            <a:spLocks noGrp="1" noRot="1" noChangeAspect="1" noMove="1" noResize="1" noEditPoints="1" noAdjustHandles="1" noChangeArrowheads="1" noChangeShapeType="1" noTextEdit="1"/>
+          </p:cNvSpPr>
+          <p:nvPr>
+            <p:extLst>
+              <p:ext uri="{386F3935-93C4-4BCD-93E2-E3B085C9AB24}">
+                <p16:designElem xmlns:p16="http://schemas.microsoft.com/office/powerpoint/2015/main" val="1"/>
+              </p:ext>
+            </p:extLst>
+          </p:nvPr>
+        </p:nvSpPr>
+        <p:spPr>
+          <a:xfrm>
+            <a:off x="3048" y="0"/>
+            <a:ext cx="12188952" cy="6858000"/>
+          </a:xfrm>
+          <a:prstGeom prst="rect">
+            <a:avLst/>
+          </a:prstGeom>
+          <a:ln>
+            <a:noFill/>
+          </a:ln>
+        </p:spPr>
+        <p:style>
+          <a:lnRef idx="2">
+            <a:schemeClr val="accent1">
+              <a:shade val="50000"/>
+            </a:schemeClr>
+          </a:lnRef>
+          <a:fillRef idx="1">
+            <a:schemeClr val="accent1"/>
+          </a:fillRef>
+          <a:effectRef idx="0">
+            <a:schemeClr val="accent1"/>
+          </a:effectRef>
+          <a:fontRef idx="minor">
+            <a:schemeClr val="lt1"/>
+          </a:fontRef>
+        </p:style>
+        <p:txBody>
+          <a:bodyPr rtlCol="0" anchor="ctr"/>
+          <a:lstStyle/>
+          <a:p>
+            <a:pPr algn="ctr"/>
+            <a:endParaRPr lang="en-US"/>
+          </a:p>
+        </p:txBody>
+      </p:sp>
+      <p:sp>
+        <p:nvSpPr>
+          <p:cNvPr id="10" name="Freeform: Shape 9">
+            <a:extLst>
+              <a:ext uri="{FF2B5EF4-FFF2-40B4-BE49-F238E27FC236}">
+                <a16:creationId xmlns:a16="http://schemas.microsoft.com/office/drawing/2014/main" id="{DAAE4CDD-124C-4DCF-9584-B6033B545DD5}"/>
+              </a:ext>
+              <a:ext uri="{C183D7F6-B498-43B3-948B-1728B52AA6E4}">
+                <adec:decorative xmlns:adec="http://schemas.microsoft.com/office/drawing/2017/decorative" val="1"/>
+              </a:ext>
+            </a:extLst>
+          </p:cNvPr>
+          <p:cNvSpPr>
+            <a:spLocks noGrp="1" noRot="1" noChangeAspect="1" noMove="1" noResize="1" noEditPoints="1" noAdjustHandles="1" noChangeArrowheads="1" noChangeShapeType="1" noTextEdit="1"/>
+          </p:cNvSpPr>
+          <p:nvPr>
+            <p:extLst>
+              <p:ext uri="{386F3935-93C4-4BCD-93E2-E3B085C9AB24}">
+                <p16:designElem xmlns:p16="http://schemas.microsoft.com/office/powerpoint/2015/main" val="1"/>
+              </p:ext>
+            </p:extLst>
+          </p:nvPr>
+        </p:nvSpPr>
+        <p:spPr>
+          <a:xfrm>
+            <a:off x="1" y="0"/>
+            <a:ext cx="4167271" cy="6858000"/>
+          </a:xfrm>
+          <a:custGeom>
+            <a:avLst/>
+            <a:gdLst>
+              <a:gd name="connsiteX0" fmla="*/ 0 w 4167271"/>
+              <a:gd name="connsiteY0" fmla="*/ 0 h 6858000"/>
+              <a:gd name="connsiteX1" fmla="*/ 2259550 w 4167271"/>
+              <a:gd name="connsiteY1" fmla="*/ 0 h 6858000"/>
+              <a:gd name="connsiteX2" fmla="*/ 2387803 w 4167271"/>
+              <a:gd name="connsiteY2" fmla="*/ 82222 h 6858000"/>
+              <a:gd name="connsiteX3" fmla="*/ 4167271 w 4167271"/>
+              <a:gd name="connsiteY3" fmla="*/ 3429000 h 6858000"/>
+              <a:gd name="connsiteX4" fmla="*/ 2387803 w 4167271"/>
+              <a:gd name="connsiteY4" fmla="*/ 6775779 h 6858000"/>
+              <a:gd name="connsiteX5" fmla="*/ 2259550 w 4167271"/>
+              <a:gd name="connsiteY5" fmla="*/ 6858000 h 6858000"/>
+              <a:gd name="connsiteX6" fmla="*/ 0 w 4167271"/>
+              <a:gd name="connsiteY6" fmla="*/ 6858000 h 6858000"/>
+            </a:gdLst>
+            <a:ahLst/>
+            <a:cxnLst>
+              <a:cxn ang="0">
+                <a:pos x="connsiteX0" y="connsiteY0"/>
+              </a:cxn>
+              <a:cxn ang="0">
+                <a:pos x="connsiteX1" y="connsiteY1"/>
+              </a:cxn>
+              <a:cxn ang="0">
+                <a:pos x="connsiteX2" y="connsiteY2"/>
+              </a:cxn>
+              <a:cxn ang="0">
+                <a:pos x="connsiteX3" y="connsiteY3"/>
+              </a:cxn>
+              <a:cxn ang="0">
+                <a:pos x="connsiteX4" y="connsiteY4"/>
+              </a:cxn>
+              <a:cxn ang="0">
+                <a:pos x="connsiteX5" y="connsiteY5"/>
+              </a:cxn>
+              <a:cxn ang="0">
+                <a:pos x="connsiteX6" y="connsiteY6"/>
+              </a:cxn>
+            </a:cxnLst>
+            <a:rect l="l" t="t" r="r" b="b"/>
+            <a:pathLst>
+              <a:path w="4167271" h="6858000">
+                <a:moveTo>
+                  <a:pt x="0" y="0"/>
+                </a:moveTo>
+                <a:lnTo>
+                  <a:pt x="2259550" y="0"/>
+                </a:lnTo>
+                <a:lnTo>
+                  <a:pt x="2387803" y="82222"/>
+                </a:lnTo>
+                <a:cubicBezTo>
+                  <a:pt x="3461407" y="807534"/>
+                  <a:pt x="4167271" y="2035835"/>
+                  <a:pt x="4167271" y="3429000"/>
+                </a:cubicBezTo>
+                <a:cubicBezTo>
+                  <a:pt x="4167271" y="4822165"/>
+                  <a:pt x="3461407" y="6050467"/>
+                  <a:pt x="2387803" y="6775779"/>
+                </a:cubicBezTo>
+                <a:lnTo>
+                  <a:pt x="2259550" y="6858000"/>
+                </a:lnTo>
+                <a:lnTo>
+                  <a:pt x="0" y="6858000"/>
+                </a:lnTo>
+                <a:close/>
+              </a:path>
+            </a:pathLst>
+          </a:custGeom>
+          <a:solidFill>
+            <a:schemeClr val="accent2"/>
+          </a:solidFill>
+          <a:ln>
+            <a:noFill/>
+          </a:ln>
+        </p:spPr>
+        <p:style>
+          <a:lnRef idx="2">
+            <a:schemeClr val="accent1">
+              <a:shade val="50000"/>
+            </a:schemeClr>
+          </a:lnRef>
+          <a:fillRef idx="1">
+            <a:schemeClr val="accent1"/>
+          </a:fillRef>
+          <a:effectRef idx="0">
+            <a:schemeClr val="accent1"/>
+          </a:effectRef>
+          <a:fontRef idx="minor">
+            <a:schemeClr val="lt1"/>
+          </a:fontRef>
+        </p:style>
+        <p:txBody>
+          <a:bodyPr rtlCol="0" anchor="ctr"/>
+          <a:lstStyle/>
+          <a:p>
+            <a:pPr algn="ctr"/>
+            <a:endParaRPr lang="en-US"/>
+          </a:p>
+        </p:txBody>
+      </p:sp>
+      <p:sp>
+        <p:nvSpPr>
+          <p:cNvPr id="2" name="Title 1">
+            <a:extLst>
+              <a:ext uri="{FF2B5EF4-FFF2-40B4-BE49-F238E27FC236}">
+                <a16:creationId xmlns:a16="http://schemas.microsoft.com/office/drawing/2014/main" id="{70080C34-6CBD-C7B7-39CD-DF8015B11C6C}"/>
+              </a:ext>
+            </a:extLst>
+          </p:cNvPr>
+          <p:cNvSpPr>
+            <a:spLocks noGrp="1"/>
+          </p:cNvSpPr>
+          <p:nvPr>
+            <p:ph type="title"/>
+          </p:nvPr>
+        </p:nvSpPr>
+        <p:spPr>
+          <a:xfrm>
+            <a:off x="686834" y="1153572"/>
+            <a:ext cx="3200400" cy="4461163"/>
+          </a:xfrm>
+        </p:spPr>
+        <p:txBody>
+          <a:bodyPr>
+            <a:normAutofit/>
+          </a:bodyPr>
+          <a:lstStyle/>
+          <a:p>
+            <a:r>
+              <a:rPr lang="en-US">
+                <a:solidFill>
+                  <a:srgbClr val="FFFFFF"/>
+                </a:solidFill>
+              </a:rPr>
+              <a:t>Future Work</a:t>
+            </a:r>
+          </a:p>
+        </p:txBody>
+      </p:sp>
+      <p:sp>
+        <p:nvSpPr>
+          <p:cNvPr id="12" name="Arc 11">
+            <a:extLst>
+              <a:ext uri="{FF2B5EF4-FFF2-40B4-BE49-F238E27FC236}">
+                <a16:creationId xmlns:a16="http://schemas.microsoft.com/office/drawing/2014/main" id="{081E4A58-353D-44AE-B2FC-2A74E2E400F7}"/>
+              </a:ext>
+              <a:ext uri="{C183D7F6-B498-43B3-948B-1728B52AA6E4}">
+                <adec:decorative xmlns:adec="http://schemas.microsoft.com/office/drawing/2017/decorative" val="1"/>
+              </a:ext>
+            </a:extLst>
+          </p:cNvPr>
+          <p:cNvSpPr>
+            <a:spLocks noGrp="1" noRot="1" noChangeAspect="1" noMove="1" noResize="1" noEditPoints="1" noAdjustHandles="1" noChangeArrowheads="1" noChangeShapeType="1" noTextEdit="1"/>
+          </p:cNvSpPr>
+          <p:nvPr>
+            <p:extLst>
+              <p:ext uri="{386F3935-93C4-4BCD-93E2-E3B085C9AB24}">
+                <p16:designElem xmlns:p16="http://schemas.microsoft.com/office/powerpoint/2015/main" val="1"/>
+              </p:ext>
+            </p:extLst>
+          </p:nvPr>
+        </p:nvSpPr>
+        <p:spPr>
+          <a:xfrm flipV="1">
+            <a:off x="7550402" y="2455479"/>
+            <a:ext cx="4083433" cy="4083433"/>
+          </a:xfrm>
+          <a:prstGeom prst="arc">
+            <a:avLst/>
+          </a:prstGeom>
+          <a:ln w="127000" cap="rnd">
+            <a:solidFill>
+              <a:schemeClr val="accent4"/>
+            </a:solidFill>
+            <a:prstDash val="dash"/>
+          </a:ln>
+        </p:spPr>
+        <p:style>
+          <a:lnRef idx="1">
+            <a:schemeClr val="accent1"/>
+          </a:lnRef>
+          <a:fillRef idx="0">
+            <a:schemeClr val="accent1"/>
+          </a:fillRef>
+          <a:effectRef idx="0">
+            <a:schemeClr val="accent1"/>
+          </a:effectRef>
+          <a:fontRef idx="minor">
+            <a:schemeClr val="tx1"/>
+          </a:fontRef>
+        </p:style>
+        <p:txBody>
+          <a:bodyPr rtlCol="0" anchor="ctr"/>
+          <a:lstStyle/>
+          <a:p>
+            <a:pPr algn="ctr"/>
+            <a:endParaRPr lang="en-US" dirty="0"/>
+          </a:p>
+        </p:txBody>
+      </p:sp>
+      <p:sp>
+        <p:nvSpPr>
+          <p:cNvPr id="3" name="Content Placeholder 2">
+            <a:extLst>
+              <a:ext uri="{FF2B5EF4-FFF2-40B4-BE49-F238E27FC236}">
+                <a16:creationId xmlns:a16="http://schemas.microsoft.com/office/drawing/2014/main" id="{229D7E99-C518-24CA-7F17-6F7C5F99159B}"/>
+              </a:ext>
+            </a:extLst>
+          </p:cNvPr>
+          <p:cNvSpPr>
+            <a:spLocks noGrp="1"/>
+          </p:cNvSpPr>
+          <p:nvPr>
+            <p:ph idx="1"/>
+          </p:nvPr>
+        </p:nvSpPr>
+        <p:spPr>
+          <a:xfrm>
+            <a:off x="4447308" y="591344"/>
+            <a:ext cx="6906491" cy="5585619"/>
+          </a:xfrm>
+        </p:spPr>
+        <p:txBody>
+          <a:bodyPr anchor="ctr">
+            <a:normAutofit/>
+          </a:bodyPr>
+          <a:lstStyle/>
+          <a:p>
+            <a:r>
+              <a:rPr lang="en-US" dirty="0"/>
+              <a:t>Companies like Microsoft would benefit from looking at sales in Japan, such as Role-Playing Games (RPGs), which would increase their overall sales output.</a:t>
+            </a:r>
+          </a:p>
+          <a:p>
+            <a:r>
+              <a:rPr lang="en-US" dirty="0"/>
+              <a:t>America and Europe both have identical sales trends for both Platforms and Genres, so marketing similarly in both of those regions will benefit game developers.</a:t>
+            </a:r>
+          </a:p>
+        </p:txBody>
+      </p:sp>
+    </p:spTree>
+    <p:extLst>
+      <p:ext uri="{BB962C8B-B14F-4D97-AF65-F5344CB8AC3E}">
+        <p14:creationId xmlns:p14="http://schemas.microsoft.com/office/powerpoint/2010/main" val="533983762"/>
+      </p:ext>
+    </p:extLst>
+  </p:cSld>
+  <p:clrMapOvr>
+    <a:masterClrMapping/>
+  </p:clrMapOvr>
+</p:sld>
+</file>
+
+<file path=ppt/slides/slide18.xml><?xml version="1.0" encoding="utf-8"?>
+<p:sld xmlns:a="http://schemas.openxmlformats.org/drawingml/2006/main" xmlns:r="http://schemas.openxmlformats.org/officeDocument/2006/relationships" xmlns:p="http://schemas.openxmlformats.org/presentationml/2006/main">
+  <p:cSld>
+    <p:bg>
+      <p:bgPr>
+        <a:solidFill>
+          <a:schemeClr val="bg1"/>
+        </a:solidFill>
+        <a:effectLst/>
+      </p:bgPr>
+    </p:bg>
+    <p:spTree>
+      <p:nvGrpSpPr>
+        <p:cNvPr id="1" name=""/>
+        <p:cNvGrpSpPr/>
+        <p:nvPr/>
+      </p:nvGrpSpPr>
+      <p:grpSpPr>
+        <a:xfrm>
+          <a:off x="0" y="0"/>
+          <a:ext cx="0" cy="0"/>
+          <a:chOff x="0" y="0"/>
+          <a:chExt cx="0" cy="0"/>
+        </a:xfrm>
+      </p:grpSpPr>
+      <p:sp useBgFill="1">
+        <p:nvSpPr>
+          <p:cNvPr id="8" name="Rectangle 7">
+            <a:extLst>
+              <a:ext uri="{FF2B5EF4-FFF2-40B4-BE49-F238E27FC236}">
+                <a16:creationId xmlns:a16="http://schemas.microsoft.com/office/drawing/2014/main" id="{907EF6B7-1338-4443-8C46-6A318D952DFD}"/>
+              </a:ext>
+              <a:ext uri="{C183D7F6-B498-43B3-948B-1728B52AA6E4}">
+                <adec:decorative xmlns:adec="http://schemas.microsoft.com/office/drawing/2017/decorative" val="1"/>
+              </a:ext>
+            </a:extLst>
+          </p:cNvPr>
+          <p:cNvSpPr>
+            <a:spLocks noGrp="1" noRot="1" noChangeAspect="1" noMove="1" noResize="1" noEditPoints="1" noAdjustHandles="1" noChangeArrowheads="1" noChangeShapeType="1" noTextEdit="1"/>
+          </p:cNvSpPr>
+          <p:nvPr>
+            <p:extLst>
+              <p:ext uri="{386F3935-93C4-4BCD-93E2-E3B085C9AB24}">
+                <p16:designElem xmlns:p16="http://schemas.microsoft.com/office/powerpoint/2015/main" val="1"/>
+              </p:ext>
+            </p:extLst>
+          </p:nvPr>
+        </p:nvSpPr>
+        <p:spPr>
+          <a:xfrm>
+            <a:off x="3048" y="0"/>
+            <a:ext cx="12188952" cy="6858000"/>
+          </a:xfrm>
+          <a:prstGeom prst="rect">
+            <a:avLst/>
+          </a:prstGeom>
+          <a:ln>
+            <a:noFill/>
+          </a:ln>
+        </p:spPr>
+        <p:style>
+          <a:lnRef idx="2">
+            <a:schemeClr val="accent1">
+              <a:shade val="50000"/>
+            </a:schemeClr>
+          </a:lnRef>
+          <a:fillRef idx="1">
+            <a:schemeClr val="accent1"/>
+          </a:fillRef>
+          <a:effectRef idx="0">
+            <a:schemeClr val="accent1"/>
+          </a:effectRef>
+          <a:fontRef idx="minor">
+            <a:schemeClr val="lt1"/>
+          </a:fontRef>
+        </p:style>
+        <p:txBody>
+          <a:bodyPr rtlCol="0" anchor="ctr"/>
+          <a:lstStyle/>
+          <a:p>
+            <a:pPr algn="ctr"/>
+            <a:endParaRPr lang="en-US"/>
+          </a:p>
+        </p:txBody>
+      </p:sp>
+      <p:sp>
+        <p:nvSpPr>
+          <p:cNvPr id="10" name="Freeform: Shape 9">
+            <a:extLst>
+              <a:ext uri="{FF2B5EF4-FFF2-40B4-BE49-F238E27FC236}">
+                <a16:creationId xmlns:a16="http://schemas.microsoft.com/office/drawing/2014/main" id="{DAAE4CDD-124C-4DCF-9584-B6033B545DD5}"/>
+              </a:ext>
+              <a:ext uri="{C183D7F6-B498-43B3-948B-1728B52AA6E4}">
+                <adec:decorative xmlns:adec="http://schemas.microsoft.com/office/drawing/2017/decorative" val="1"/>
+              </a:ext>
+            </a:extLst>
+          </p:cNvPr>
+          <p:cNvSpPr>
+            <a:spLocks noGrp="1" noRot="1" noChangeAspect="1" noMove="1" noResize="1" noEditPoints="1" noAdjustHandles="1" noChangeArrowheads="1" noChangeShapeType="1" noTextEdit="1"/>
+          </p:cNvSpPr>
+          <p:nvPr>
+            <p:extLst>
+              <p:ext uri="{386F3935-93C4-4BCD-93E2-E3B085C9AB24}">
+                <p16:designElem xmlns:p16="http://schemas.microsoft.com/office/powerpoint/2015/main" val="1"/>
+              </p:ext>
+            </p:extLst>
+          </p:nvPr>
+        </p:nvSpPr>
+        <p:spPr>
+          <a:xfrm>
+            <a:off x="1" y="0"/>
+            <a:ext cx="4167271" cy="6858000"/>
+          </a:xfrm>
+          <a:custGeom>
+            <a:avLst/>
+            <a:gdLst>
+              <a:gd name="connsiteX0" fmla="*/ 0 w 4167271"/>
+              <a:gd name="connsiteY0" fmla="*/ 0 h 6858000"/>
+              <a:gd name="connsiteX1" fmla="*/ 2259550 w 4167271"/>
+              <a:gd name="connsiteY1" fmla="*/ 0 h 6858000"/>
+              <a:gd name="connsiteX2" fmla="*/ 2387803 w 4167271"/>
+              <a:gd name="connsiteY2" fmla="*/ 82222 h 6858000"/>
+              <a:gd name="connsiteX3" fmla="*/ 4167271 w 4167271"/>
+              <a:gd name="connsiteY3" fmla="*/ 3429000 h 6858000"/>
+              <a:gd name="connsiteX4" fmla="*/ 2387803 w 4167271"/>
+              <a:gd name="connsiteY4" fmla="*/ 6775779 h 6858000"/>
+              <a:gd name="connsiteX5" fmla="*/ 2259550 w 4167271"/>
+              <a:gd name="connsiteY5" fmla="*/ 6858000 h 6858000"/>
+              <a:gd name="connsiteX6" fmla="*/ 0 w 4167271"/>
+              <a:gd name="connsiteY6" fmla="*/ 6858000 h 6858000"/>
+            </a:gdLst>
+            <a:ahLst/>
+            <a:cxnLst>
+              <a:cxn ang="0">
+                <a:pos x="connsiteX0" y="connsiteY0"/>
+              </a:cxn>
+              <a:cxn ang="0">
+                <a:pos x="connsiteX1" y="connsiteY1"/>
+              </a:cxn>
+              <a:cxn ang="0">
+                <a:pos x="connsiteX2" y="connsiteY2"/>
+              </a:cxn>
+              <a:cxn ang="0">
+                <a:pos x="connsiteX3" y="connsiteY3"/>
+              </a:cxn>
+              <a:cxn ang="0">
+                <a:pos x="connsiteX4" y="connsiteY4"/>
+              </a:cxn>
+              <a:cxn ang="0">
+                <a:pos x="connsiteX5" y="connsiteY5"/>
+              </a:cxn>
+              <a:cxn ang="0">
+                <a:pos x="connsiteX6" y="connsiteY6"/>
+              </a:cxn>
+            </a:cxnLst>
+            <a:rect l="l" t="t" r="r" b="b"/>
+            <a:pathLst>
+              <a:path w="4167271" h="6858000">
+                <a:moveTo>
+                  <a:pt x="0" y="0"/>
+                </a:moveTo>
+                <a:lnTo>
+                  <a:pt x="2259550" y="0"/>
+                </a:lnTo>
+                <a:lnTo>
+                  <a:pt x="2387803" y="82222"/>
+                </a:lnTo>
+                <a:cubicBezTo>
+                  <a:pt x="3461407" y="807534"/>
+                  <a:pt x="4167271" y="2035835"/>
+                  <a:pt x="4167271" y="3429000"/>
+                </a:cubicBezTo>
+                <a:cubicBezTo>
+                  <a:pt x="4167271" y="4822165"/>
+                  <a:pt x="3461407" y="6050467"/>
+                  <a:pt x="2387803" y="6775779"/>
+                </a:cubicBezTo>
+                <a:lnTo>
+                  <a:pt x="2259550" y="6858000"/>
+                </a:lnTo>
+                <a:lnTo>
+                  <a:pt x="0" y="6858000"/>
+                </a:lnTo>
+                <a:close/>
+              </a:path>
+            </a:pathLst>
+          </a:custGeom>
+          <a:solidFill>
+            <a:schemeClr val="accent2"/>
+          </a:solidFill>
+          <a:ln>
+            <a:noFill/>
+          </a:ln>
+        </p:spPr>
+        <p:style>
+          <a:lnRef idx="2">
+            <a:schemeClr val="accent1">
+              <a:shade val="50000"/>
+            </a:schemeClr>
+          </a:lnRef>
+          <a:fillRef idx="1">
+            <a:schemeClr val="accent1"/>
+          </a:fillRef>
+          <a:effectRef idx="0">
+            <a:schemeClr val="accent1"/>
+          </a:effectRef>
+          <a:fontRef idx="minor">
+            <a:schemeClr val="lt1"/>
+          </a:fontRef>
+        </p:style>
+        <p:txBody>
+          <a:bodyPr rtlCol="0" anchor="ctr"/>
+          <a:lstStyle/>
+          <a:p>
+            <a:pPr algn="ctr"/>
+            <a:endParaRPr lang="en-US"/>
+          </a:p>
+        </p:txBody>
+      </p:sp>
+      <p:sp>
+        <p:nvSpPr>
+          <p:cNvPr id="2" name="Title 1">
+            <a:extLst>
+              <a:ext uri="{FF2B5EF4-FFF2-40B4-BE49-F238E27FC236}">
+                <a16:creationId xmlns:a16="http://schemas.microsoft.com/office/drawing/2014/main" id="{587538E4-DC98-5E1E-271D-374AFEA60997}"/>
+              </a:ext>
+            </a:extLst>
+          </p:cNvPr>
+          <p:cNvSpPr>
+            <a:spLocks noGrp="1"/>
+          </p:cNvSpPr>
+          <p:nvPr>
+            <p:ph type="title"/>
+          </p:nvPr>
+        </p:nvSpPr>
+        <p:spPr>
+          <a:xfrm>
+            <a:off x="686834" y="1153572"/>
+            <a:ext cx="3200400" cy="4461163"/>
+          </a:xfrm>
+        </p:spPr>
+        <p:txBody>
+          <a:bodyPr>
+            <a:normAutofit/>
+          </a:bodyPr>
+          <a:lstStyle/>
+          <a:p>
+            <a:r>
+              <a:rPr lang="en-US">
+                <a:solidFill>
+                  <a:srgbClr val="FFFFFF"/>
+                </a:solidFill>
+              </a:rPr>
+              <a:t>Work Cited</a:t>
+            </a:r>
+          </a:p>
+        </p:txBody>
+      </p:sp>
+      <p:sp>
+        <p:nvSpPr>
+          <p:cNvPr id="12" name="Arc 11">
+            <a:extLst>
+              <a:ext uri="{FF2B5EF4-FFF2-40B4-BE49-F238E27FC236}">
+                <a16:creationId xmlns:a16="http://schemas.microsoft.com/office/drawing/2014/main" id="{081E4A58-353D-44AE-B2FC-2A74E2E400F7}"/>
+              </a:ext>
+              <a:ext uri="{C183D7F6-B498-43B3-948B-1728B52AA6E4}">
+                <adec:decorative xmlns:adec="http://schemas.microsoft.com/office/drawing/2017/decorative" val="1"/>
+              </a:ext>
+            </a:extLst>
+          </p:cNvPr>
+          <p:cNvSpPr>
+            <a:spLocks noGrp="1" noRot="1" noChangeAspect="1" noMove="1" noResize="1" noEditPoints="1" noAdjustHandles="1" noChangeArrowheads="1" noChangeShapeType="1" noTextEdit="1"/>
+          </p:cNvSpPr>
+          <p:nvPr>
+            <p:extLst>
+              <p:ext uri="{386F3935-93C4-4BCD-93E2-E3B085C9AB24}">
+                <p16:designElem xmlns:p16="http://schemas.microsoft.com/office/powerpoint/2015/main" val="1"/>
+              </p:ext>
+            </p:extLst>
+          </p:nvPr>
+        </p:nvSpPr>
+        <p:spPr>
+          <a:xfrm flipV="1">
+            <a:off x="7550402" y="2455479"/>
+            <a:ext cx="4083433" cy="4083433"/>
+          </a:xfrm>
+          <a:prstGeom prst="arc">
+            <a:avLst/>
+          </a:prstGeom>
+          <a:ln w="127000" cap="rnd">
+            <a:solidFill>
+              <a:schemeClr val="accent4"/>
+            </a:solidFill>
+            <a:prstDash val="dash"/>
+          </a:ln>
+        </p:spPr>
+        <p:style>
+          <a:lnRef idx="1">
+            <a:schemeClr val="accent1"/>
+          </a:lnRef>
+          <a:fillRef idx="0">
+            <a:schemeClr val="accent1"/>
+          </a:fillRef>
+          <a:effectRef idx="0">
+            <a:schemeClr val="accent1"/>
+          </a:effectRef>
+          <a:fontRef idx="minor">
+            <a:schemeClr val="tx1"/>
+          </a:fontRef>
+        </p:style>
+        <p:txBody>
+          <a:bodyPr rtlCol="0" anchor="ctr"/>
+          <a:lstStyle/>
+          <a:p>
+            <a:pPr algn="ctr"/>
+            <a:endParaRPr lang="en-US" dirty="0"/>
+          </a:p>
+        </p:txBody>
+      </p:sp>
+      <p:sp>
+        <p:nvSpPr>
+          <p:cNvPr id="3" name="Content Placeholder 2">
+            <a:extLst>
+              <a:ext uri="{FF2B5EF4-FFF2-40B4-BE49-F238E27FC236}">
+                <a16:creationId xmlns:a16="http://schemas.microsoft.com/office/drawing/2014/main" id="{B6F98BE9-D13C-78FC-98A3-30642018F131}"/>
+              </a:ext>
+            </a:extLst>
+          </p:cNvPr>
+          <p:cNvSpPr>
+            <a:spLocks noGrp="1"/>
+          </p:cNvSpPr>
+          <p:nvPr>
+            <p:ph idx="1"/>
+          </p:nvPr>
+        </p:nvSpPr>
+        <p:spPr>
+          <a:xfrm>
+            <a:off x="4447308" y="591344"/>
+            <a:ext cx="6906491" cy="5585619"/>
+          </a:xfrm>
+        </p:spPr>
+        <p:txBody>
+          <a:bodyPr anchor="ctr">
+            <a:normAutofit/>
+          </a:bodyPr>
+          <a:lstStyle/>
+          <a:p>
+            <a:r>
+              <a:rPr lang="en-US" dirty="0">
+                <a:hlinkClick r:id="rId2"/>
+              </a:rPr>
+              <a:t>https://www.kaggle.com/code/upadorprofzs/eda-video-game-sales</a:t>
+            </a:r>
+            <a:endParaRPr lang="en-US" dirty="0"/>
+          </a:p>
+          <a:p>
+            <a:r>
+              <a:rPr lang="en-US" dirty="0">
+                <a:hlinkClick r:id="rId3"/>
+              </a:rPr>
+              <a:t>https://chatgpt.com/</a:t>
+            </a:r>
+            <a:endParaRPr lang="en-US" dirty="0"/>
+          </a:p>
+          <a:p>
+            <a:endParaRPr lang="en-US" dirty="0"/>
+          </a:p>
+          <a:p>
+            <a:r>
+              <a:rPr lang="en-US" dirty="0"/>
+              <a:t>Kaggle is the source of our Data set, and Chat GPT was referenced throughout our presentation to formulate our thesis as well as understand our Bias and Limitation.</a:t>
+            </a:r>
+          </a:p>
+        </p:txBody>
+      </p:sp>
+    </p:spTree>
+    <p:extLst>
+      <p:ext uri="{BB962C8B-B14F-4D97-AF65-F5344CB8AC3E}">
+        <p14:creationId xmlns:p14="http://schemas.microsoft.com/office/powerpoint/2010/main" val="3661908977"/>
+      </p:ext>
+    </p:extLst>
+  </p:cSld>
+  <p:clrMapOvr>
+    <a:masterClrMapping/>
+  </p:clrMapOvr>
+</p:sld>
+</file>
+
+<file path=ppt/slides/slide19.xml><?xml version="1.0" encoding="utf-8"?>
+<p:sld xmlns:a="http://schemas.openxmlformats.org/drawingml/2006/main" xmlns:r="http://schemas.openxmlformats.org/officeDocument/2006/relationships" xmlns:p="http://schemas.openxmlformats.org/presentationml/2006/main">
+  <p:cSld>
+    <p:bg>
+      <p:bgPr>
+        <a:solidFill>
+          <a:schemeClr val="bg1"/>
+        </a:solidFill>
+        <a:effectLst/>
+      </p:bgPr>
+    </p:bg>
+    <p:spTree>
+      <p:nvGrpSpPr>
+        <p:cNvPr id="1" name=""/>
+        <p:cNvGrpSpPr/>
+        <p:nvPr/>
+      </p:nvGrpSpPr>
+      <p:grpSpPr>
+        <a:xfrm>
+          <a:off x="0" y="0"/>
+          <a:ext cx="0" cy="0"/>
+          <a:chOff x="0" y="0"/>
+          <a:chExt cx="0" cy="0"/>
+        </a:xfrm>
+      </p:grpSpPr>
+      <p:sp useBgFill="1">
+        <p:nvSpPr>
+          <p:cNvPr id="7" name="Rectangle 6">
+            <a:extLst>
+              <a:ext uri="{FF2B5EF4-FFF2-40B4-BE49-F238E27FC236}">
+                <a16:creationId xmlns:a16="http://schemas.microsoft.com/office/drawing/2014/main" id="{4E1BEB12-92AF-4445-98AD-4C7756E7C93B}"/>
+              </a:ext>
+              <a:ext uri="{C183D7F6-B498-43B3-948B-1728B52AA6E4}">
+                <adec:decorative xmlns:adec="http://schemas.microsoft.com/office/drawing/2017/decorative" val="1"/>
+              </a:ext>
+            </a:extLst>
+          </p:cNvPr>
+          <p:cNvSpPr>
+            <a:spLocks noGrp="1" noRot="1" noChangeAspect="1" noMove="1" noResize="1" noEditPoints="1" noAdjustHandles="1" noChangeArrowheads="1" noChangeShapeType="1" noTextEdit="1"/>
+          </p:cNvSpPr>
+          <p:nvPr>
+            <p:extLst>
+              <p:ext uri="{386F3935-93C4-4BCD-93E2-E3B085C9AB24}">
+                <p16:designElem xmlns:p16="http://schemas.microsoft.com/office/powerpoint/2015/main" val="1"/>
+              </p:ext>
+            </p:extLst>
+          </p:nvPr>
+        </p:nvSpPr>
+        <p:spPr>
+          <a:xfrm>
+            <a:off x="3048" y="0"/>
+            <a:ext cx="12188952" cy="6858000"/>
+          </a:xfrm>
+          <a:prstGeom prst="rect">
+            <a:avLst/>
+          </a:prstGeom>
+          <a:ln>
+            <a:noFill/>
+          </a:ln>
+        </p:spPr>
+        <p:style>
+          <a:lnRef idx="2">
+            <a:schemeClr val="accent1">
+              <a:shade val="50000"/>
+            </a:schemeClr>
+          </a:lnRef>
+          <a:fillRef idx="1">
+            <a:schemeClr val="accent1"/>
+          </a:fillRef>
+          <a:effectRef idx="0">
+            <a:schemeClr val="accent1"/>
+          </a:effectRef>
+          <a:fontRef idx="minor">
+            <a:schemeClr val="lt1"/>
+          </a:fontRef>
+        </p:style>
+        <p:txBody>
+          <a:bodyPr rtlCol="0" anchor="ctr"/>
+          <a:lstStyle/>
+          <a:p>
+            <a:pPr algn="ctr"/>
+            <a:endParaRPr lang="en-US"/>
+          </a:p>
+        </p:txBody>
+      </p:sp>
+      <p:sp>
+        <p:nvSpPr>
+          <p:cNvPr id="9" name="Rectangle 8">
+            <a:extLst>
+              <a:ext uri="{FF2B5EF4-FFF2-40B4-BE49-F238E27FC236}">
+                <a16:creationId xmlns:a16="http://schemas.microsoft.com/office/drawing/2014/main" id="{D0522C2C-7B5C-48A7-A969-03941E5D2E76}"/>
+              </a:ext>
+              <a:ext uri="{C183D7F6-B498-43B3-948B-1728B52AA6E4}">
+                <adec:decorative xmlns:adec="http://schemas.microsoft.com/office/drawing/2017/decorative" val="1"/>
+              </a:ext>
+            </a:extLst>
+          </p:cNvPr>
+          <p:cNvSpPr>
+            <a:spLocks noGrp="1" noRot="1" noChangeAspect="1" noMove="1" noResize="1" noEditPoints="1" noAdjustHandles="1" noChangeArrowheads="1" noChangeShapeType="1" noTextEdit="1"/>
+          </p:cNvSpPr>
+          <p:nvPr>
+            <p:extLst>
+              <p:ext uri="{386F3935-93C4-4BCD-93E2-E3B085C9AB24}">
+                <p16:designElem xmlns:p16="http://schemas.microsoft.com/office/powerpoint/2015/main" val="1"/>
+              </p:ext>
+            </p:extLst>
+          </p:nvPr>
+        </p:nvSpPr>
+        <p:spPr>
+          <a:xfrm>
+            <a:off x="0" y="0"/>
+            <a:ext cx="12192000" cy="6858000"/>
+          </a:xfrm>
+          <a:prstGeom prst="rect">
+            <a:avLst/>
+          </a:prstGeom>
+          <a:solidFill>
+            <a:schemeClr val="accent2"/>
+          </a:solidFill>
+          <a:ln>
+            <a:noFill/>
+          </a:ln>
+        </p:spPr>
+        <p:style>
+          <a:lnRef idx="2">
+            <a:schemeClr val="accent1">
+              <a:shade val="50000"/>
+            </a:schemeClr>
+          </a:lnRef>
+          <a:fillRef idx="1">
+            <a:schemeClr val="accent1"/>
+          </a:fillRef>
+          <a:effectRef idx="0">
+            <a:schemeClr val="accent1"/>
+          </a:effectRef>
+          <a:fontRef idx="minor">
+            <a:schemeClr val="lt1"/>
+          </a:fontRef>
+        </p:style>
+        <p:txBody>
+          <a:bodyPr rtlCol="0" anchor="ctr"/>
+          <a:lstStyle/>
+          <a:p>
+            <a:pPr algn="ctr"/>
+            <a:endParaRPr lang="en-US">
+              <a:solidFill>
+                <a:schemeClr val="tx1"/>
+              </a:solidFill>
+            </a:endParaRPr>
+          </a:p>
+        </p:txBody>
+      </p:sp>
+      <p:sp>
+        <p:nvSpPr>
+          <p:cNvPr id="11" name="Freeform 13">
+            <a:extLst>
+              <a:ext uri="{FF2B5EF4-FFF2-40B4-BE49-F238E27FC236}">
+                <a16:creationId xmlns:a16="http://schemas.microsoft.com/office/drawing/2014/main" id="{9C682A1A-5B2D-4111-BBD6-620165633E5B}"/>
+              </a:ext>
+              <a:ext uri="{C183D7F6-B498-43B3-948B-1728B52AA6E4}">
+                <adec:decorative xmlns:adec="http://schemas.microsoft.com/office/drawing/2017/decorative" val="1"/>
+              </a:ext>
+            </a:extLst>
+          </p:cNvPr>
+          <p:cNvSpPr>
+            <a:spLocks noGrp="1" noRot="1" noChangeAspect="1" noMove="1" noResize="1" noEditPoints="1" noAdjustHandles="1" noChangeArrowheads="1" noChangeShapeType="1" noTextEdit="1"/>
+          </p:cNvSpPr>
+          <p:nvPr>
+            <p:extLst>
+              <p:ext uri="{386F3935-93C4-4BCD-93E2-E3B085C9AB24}">
+                <p16:designElem xmlns:p16="http://schemas.microsoft.com/office/powerpoint/2015/main" val="1"/>
+              </p:ext>
+            </p:extLst>
+          </p:nvPr>
+        </p:nvSpPr>
+        <p:spPr>
+          <a:xfrm>
+            <a:off x="2769476" y="220196"/>
+            <a:ext cx="9422524" cy="6637806"/>
+          </a:xfrm>
+          <a:custGeom>
+            <a:avLst/>
+            <a:gdLst>
+              <a:gd name="connsiteX0" fmla="*/ 4929467 w 8191500"/>
+              <a:gd name="connsiteY0" fmla="*/ 0 h 5770597"/>
+              <a:gd name="connsiteX1" fmla="*/ 8065066 w 8191500"/>
+              <a:gd name="connsiteY1" fmla="*/ 1118513 h 5770597"/>
+              <a:gd name="connsiteX2" fmla="*/ 8191500 w 8191500"/>
+              <a:gd name="connsiteY2" fmla="*/ 1227339 h 5770597"/>
+              <a:gd name="connsiteX3" fmla="*/ 8191500 w 8191500"/>
+              <a:gd name="connsiteY3" fmla="*/ 5770597 h 5770597"/>
+              <a:gd name="connsiteX4" fmla="*/ 79523 w 8191500"/>
+              <a:gd name="connsiteY4" fmla="*/ 5770597 h 5770597"/>
+              <a:gd name="connsiteX5" fmla="*/ 56799 w 8191500"/>
+              <a:gd name="connsiteY5" fmla="*/ 5644158 h 5770597"/>
+              <a:gd name="connsiteX6" fmla="*/ 0 w 8191500"/>
+              <a:gd name="connsiteY6" fmla="*/ 4898209 h 5770597"/>
+              <a:gd name="connsiteX7" fmla="*/ 4929467 w 8191500"/>
+              <a:gd name="connsiteY7" fmla="*/ 0 h 5770597"/>
+            </a:gdLst>
+            <a:ahLst/>
+            <a:cxnLst>
+              <a:cxn ang="0">
+                <a:pos x="connsiteX0" y="connsiteY0"/>
+              </a:cxn>
+              <a:cxn ang="0">
+                <a:pos x="connsiteX1" y="connsiteY1"/>
+              </a:cxn>
+              <a:cxn ang="0">
+                <a:pos x="connsiteX2" y="connsiteY2"/>
+              </a:cxn>
+              <a:cxn ang="0">
+                <a:pos x="connsiteX3" y="connsiteY3"/>
+              </a:cxn>
+              <a:cxn ang="0">
+                <a:pos x="connsiteX4" y="connsiteY4"/>
+              </a:cxn>
+              <a:cxn ang="0">
+                <a:pos x="connsiteX5" y="connsiteY5"/>
+              </a:cxn>
+              <a:cxn ang="0">
+                <a:pos x="connsiteX6" y="connsiteY6"/>
+              </a:cxn>
+              <a:cxn ang="0">
+                <a:pos x="connsiteX7" y="connsiteY7"/>
+              </a:cxn>
+            </a:cxnLst>
+            <a:rect l="l" t="t" r="r" b="b"/>
+            <a:pathLst>
+              <a:path w="8191500" h="5770597">
+                <a:moveTo>
+                  <a:pt x="4929467" y="0"/>
+                </a:moveTo>
+                <a:cubicBezTo>
+                  <a:pt x="6120547" y="0"/>
+                  <a:pt x="7212963" y="419755"/>
+                  <a:pt x="8065066" y="1118513"/>
+                </a:cubicBezTo>
+                <a:lnTo>
+                  <a:pt x="8191500" y="1227339"/>
+                </a:lnTo>
+                <a:lnTo>
+                  <a:pt x="8191500" y="5770597"/>
+                </a:lnTo>
+                <a:lnTo>
+                  <a:pt x="79523" y="5770597"/>
+                </a:lnTo>
+                <a:lnTo>
+                  <a:pt x="56799" y="5644158"/>
+                </a:lnTo>
+                <a:cubicBezTo>
+                  <a:pt x="19398" y="5400934"/>
+                  <a:pt x="0" y="5151822"/>
+                  <a:pt x="0" y="4898209"/>
+                </a:cubicBezTo>
+                <a:cubicBezTo>
+                  <a:pt x="0" y="2193003"/>
+                  <a:pt x="2206998" y="0"/>
+                  <a:pt x="4929467" y="0"/>
+                </a:cubicBezTo>
+                <a:close/>
+              </a:path>
+            </a:pathLst>
+          </a:custGeom>
+          <a:solidFill>
+            <a:schemeClr val="bg1"/>
+          </a:solidFill>
+          <a:ln>
+            <a:noFill/>
+          </a:ln>
+        </p:spPr>
+        <p:style>
+          <a:lnRef idx="2">
+            <a:schemeClr val="accent1">
+              <a:shade val="50000"/>
+            </a:schemeClr>
+          </a:lnRef>
+          <a:fillRef idx="1">
+            <a:schemeClr val="accent1"/>
+          </a:fillRef>
+          <a:effectRef idx="0">
+            <a:schemeClr val="accent1"/>
+          </a:effectRef>
+          <a:fontRef idx="minor">
+            <a:schemeClr val="lt1"/>
+          </a:fontRef>
+        </p:style>
+        <p:txBody>
+          <a:bodyPr wrap="square" rtlCol="0" anchor="ctr">
+            <a:noAutofit/>
+          </a:bodyPr>
+          <a:lstStyle/>
+          <a:p>
+            <a:pPr marL="0" marR="0" lvl="0" indent="0" algn="ctr" defTabSz="914400" rtl="0" eaLnBrk="1" fontAlgn="auto" latinLnBrk="0" hangingPunct="1">
+              <a:lnSpc>
+                <a:spcPct val="100000"/>
+              </a:lnSpc>
+              <a:spcBef>
+                <a:spcPts val="0"/>
+              </a:spcBef>
+              <a:spcAft>
+                <a:spcPts val="0"/>
+              </a:spcAft>
+              <a:buClrTx/>
+              <a:buSzTx/>
+              <a:buFontTx/>
+              <a:buNone/>
+              <a:tabLst/>
+              <a:defRPr/>
+            </a:pPr>
+            <a:endParaRPr kumimoji="0" lang="en-US" sz="1800" b="0" i="0" u="none" strike="noStrike" kern="1200" cap="none" spc="0" normalizeH="0" baseline="0" noProof="0">
+              <a:ln>
+                <a:noFill/>
+              </a:ln>
+              <a:solidFill>
+                <a:srgbClr val="FFFFFF"/>
+              </a:solidFill>
+              <a:effectLst/>
+              <a:uLnTx/>
+              <a:uFillTx/>
+              <a:latin typeface="Calibri" panose="020F0502020204030204"/>
+              <a:ea typeface="+mn-ea"/>
+              <a:cs typeface="+mn-cs"/>
+            </a:endParaRPr>
+          </a:p>
+        </p:txBody>
+      </p:sp>
+      <p:sp>
+        <p:nvSpPr>
+          <p:cNvPr id="13" name="Oval 12">
+            <a:extLst>
+              <a:ext uri="{FF2B5EF4-FFF2-40B4-BE49-F238E27FC236}">
+                <a16:creationId xmlns:a16="http://schemas.microsoft.com/office/drawing/2014/main" id="{D6EE29F2-D77F-4BD0-A20B-334D316A1C9D}"/>
+              </a:ext>
+              <a:ext uri="{C183D7F6-B498-43B3-948B-1728B52AA6E4}">
+                <adec:decorative xmlns:adec="http://schemas.microsoft.com/office/drawing/2017/decorative" val="1"/>
+              </a:ext>
+            </a:extLst>
+          </p:cNvPr>
+          <p:cNvSpPr>
+            <a:spLocks noGrp="1" noRot="1" noChangeAspect="1" noMove="1" noResize="1" noEditPoints="1" noAdjustHandles="1" noChangeArrowheads="1" noChangeShapeType="1" noTextEdit="1"/>
+          </p:cNvSpPr>
+          <p:nvPr>
+            <p:extLst>
+              <p:ext uri="{386F3935-93C4-4BCD-93E2-E3B085C9AB24}">
+                <p16:designElem xmlns:p16="http://schemas.microsoft.com/office/powerpoint/2015/main" val="1"/>
+              </p:ext>
+            </p:extLst>
+          </p:nvPr>
+        </p:nvSpPr>
+        <p:spPr>
+          <a:xfrm>
+            <a:off x="2209800" y="2099696"/>
+            <a:ext cx="1942241" cy="1889551"/>
+          </a:xfrm>
+          <a:prstGeom prst="ellipse">
+            <a:avLst/>
+          </a:prstGeom>
+          <a:solidFill>
+            <a:schemeClr val="accent4"/>
+          </a:solidFill>
+          <a:ln>
+            <a:noFill/>
+          </a:ln>
+        </p:spPr>
+        <p:style>
+          <a:lnRef idx="2">
+            <a:schemeClr val="accent1">
+              <a:shade val="50000"/>
+            </a:schemeClr>
+          </a:lnRef>
+          <a:fillRef idx="1">
+            <a:schemeClr val="accent1"/>
+          </a:fillRef>
+          <a:effectRef idx="0">
+            <a:schemeClr val="accent1"/>
+          </a:effectRef>
+          <a:fontRef idx="minor">
+            <a:schemeClr val="lt1"/>
+          </a:fontRef>
+        </p:style>
+        <p:txBody>
+          <a:bodyPr rtlCol="0" anchor="ctr"/>
+          <a:lstStyle/>
+          <a:p>
+            <a:pPr marL="0" marR="0" lvl="0" indent="0" algn="ctr" defTabSz="914400" rtl="0" eaLnBrk="1" fontAlgn="auto" latinLnBrk="0" hangingPunct="1">
+              <a:lnSpc>
+                <a:spcPct val="100000"/>
+              </a:lnSpc>
+              <a:spcBef>
+                <a:spcPts val="0"/>
+              </a:spcBef>
+              <a:spcAft>
+                <a:spcPts val="0"/>
+              </a:spcAft>
+              <a:buClrTx/>
+              <a:buSzTx/>
+              <a:buFontTx/>
+              <a:buNone/>
+              <a:tabLst/>
+              <a:defRPr/>
+            </a:pPr>
+            <a:endParaRPr kumimoji="0" lang="en-US" sz="1800" b="0" i="0" u="none" strike="noStrike" kern="1200" cap="none" spc="0" normalizeH="0" baseline="0" noProof="0">
+              <a:ln>
+                <a:noFill/>
+              </a:ln>
+              <a:solidFill>
+                <a:srgbClr val="FFFFFF"/>
+              </a:solidFill>
+              <a:effectLst/>
+              <a:uLnTx/>
+              <a:uFillTx/>
+              <a:latin typeface="Calibri" panose="020F0502020204030204"/>
+              <a:ea typeface="+mn-ea"/>
+              <a:cs typeface="+mn-cs"/>
+            </a:endParaRPr>
+          </a:p>
+        </p:txBody>
+      </p:sp>
+      <p:sp>
+        <p:nvSpPr>
+          <p:cNvPr id="15" name="Arc 14">
+            <a:extLst>
+              <a:ext uri="{FF2B5EF4-FFF2-40B4-BE49-F238E27FC236}">
+                <a16:creationId xmlns:a16="http://schemas.microsoft.com/office/drawing/2014/main" id="{22D09ED2-868F-42C6-866E-F92E0CEF314F}"/>
+              </a:ext>
+              <a:ext uri="{C183D7F6-B498-43B3-948B-1728B52AA6E4}">
+                <adec:decorative xmlns:adec="http://schemas.microsoft.com/office/drawing/2017/decorative" val="1"/>
+              </a:ext>
+            </a:extLst>
+          </p:cNvPr>
+          <p:cNvSpPr>
+            <a:spLocks noGrp="1" noRot="1" noChangeAspect="1" noMove="1" noResize="1" noEditPoints="1" noAdjustHandles="1" noChangeArrowheads="1" noChangeShapeType="1" noTextEdit="1"/>
+          </p:cNvSpPr>
+          <p:nvPr>
+            <p:extLst>
+              <p:ext uri="{386F3935-93C4-4BCD-93E2-E3B085C9AB24}">
+                <p16:designElem xmlns:p16="http://schemas.microsoft.com/office/powerpoint/2015/main" val="1"/>
+              </p:ext>
+            </p:extLst>
+          </p:nvPr>
+        </p:nvSpPr>
+        <p:spPr>
+          <a:xfrm rot="18520172">
+            <a:off x="1613162" y="1492572"/>
+            <a:ext cx="2987899" cy="2987899"/>
+          </a:xfrm>
+          <a:prstGeom prst="arc">
+            <a:avLst>
+              <a:gd name="adj1" fmla="val 14455503"/>
+              <a:gd name="adj2" fmla="val 227775"/>
+            </a:avLst>
+          </a:prstGeom>
+          <a:ln w="127000" cap="rnd">
+            <a:solidFill>
+              <a:schemeClr val="accent4"/>
+            </a:solidFill>
+            <a:prstDash val="dash"/>
+            <a:miter lim="800000"/>
+          </a:ln>
+        </p:spPr>
+        <p:style>
+          <a:lnRef idx="1">
+            <a:schemeClr val="accent1"/>
+          </a:lnRef>
+          <a:fillRef idx="0">
+            <a:schemeClr val="accent1"/>
+          </a:fillRef>
+          <a:effectRef idx="0">
+            <a:schemeClr val="accent1"/>
+          </a:effectRef>
+          <a:fontRef idx="minor">
+            <a:schemeClr val="tx1"/>
+          </a:fontRef>
+        </p:style>
+        <p:txBody>
+          <a:bodyPr rtlCol="0" anchor="ctr"/>
+          <a:lstStyle/>
+          <a:p>
+            <a:pPr marL="0" marR="0" lvl="0" indent="0" algn="ctr" defTabSz="914400" rtl="0" eaLnBrk="1" fontAlgn="auto" latinLnBrk="0" hangingPunct="1">
+              <a:lnSpc>
+                <a:spcPct val="100000"/>
+              </a:lnSpc>
+              <a:spcBef>
+                <a:spcPts val="0"/>
+              </a:spcBef>
+              <a:spcAft>
+                <a:spcPts val="0"/>
+              </a:spcAft>
+              <a:buClrTx/>
+              <a:buSzTx/>
+              <a:buFontTx/>
+              <a:buNone/>
+              <a:tabLst/>
+              <a:defRPr/>
+            </a:pPr>
+            <a:endParaRPr kumimoji="0" lang="en-US" sz="1800" b="0" i="0" u="none" strike="noStrike" kern="1200" cap="none" spc="0" normalizeH="0" baseline="0" noProof="0">
+              <a:ln>
+                <a:noFill/>
+              </a:ln>
+              <a:solidFill>
+                <a:srgbClr val="000000"/>
+              </a:solidFill>
+              <a:effectLst/>
+              <a:uLnTx/>
+              <a:uFillTx/>
+              <a:latin typeface="Calibri" panose="020F0502020204030204"/>
+              <a:ea typeface="+mn-ea"/>
+              <a:cs typeface="+mn-cs"/>
+            </a:endParaRPr>
+          </a:p>
+        </p:txBody>
+      </p:sp>
+      <p:sp>
+        <p:nvSpPr>
+          <p:cNvPr id="2" name="Title 1">
+            <a:extLst>
+              <a:ext uri="{FF2B5EF4-FFF2-40B4-BE49-F238E27FC236}">
+                <a16:creationId xmlns:a16="http://schemas.microsoft.com/office/drawing/2014/main" id="{A30E5892-0CE7-DBA4-A3D6-B26CD8E33CC2}"/>
+              </a:ext>
+            </a:extLst>
+          </p:cNvPr>
+          <p:cNvSpPr>
+            <a:spLocks noGrp="1"/>
+          </p:cNvSpPr>
+          <p:nvPr>
+            <p:ph type="title"/>
+          </p:nvPr>
+        </p:nvSpPr>
+        <p:spPr>
+          <a:xfrm>
+            <a:off x="4038600" y="1939159"/>
+            <a:ext cx="7644627" cy="2751086"/>
+          </a:xfrm>
+        </p:spPr>
+        <p:txBody>
+          <a:bodyPr vert="horz" lIns="91440" tIns="45720" rIns="91440" bIns="45720" rtlCol="0" anchor="b">
+            <a:normAutofit/>
+          </a:bodyPr>
+          <a:lstStyle/>
+          <a:p>
+            <a:pPr algn="r"/>
+            <a:r>
+              <a:rPr lang="en-US" sz="6000" kern="1200">
+                <a:solidFill>
+                  <a:schemeClr val="tx1"/>
+                </a:solidFill>
+                <a:latin typeface="+mj-lt"/>
+                <a:ea typeface="+mj-ea"/>
+                <a:cs typeface="+mj-cs"/>
+              </a:rPr>
+              <a:t>Q&amp;A</a:t>
+            </a:r>
+          </a:p>
+        </p:txBody>
+      </p:sp>
+    </p:spTree>
+    <p:extLst>
+      <p:ext uri="{BB962C8B-B14F-4D97-AF65-F5344CB8AC3E}">
+        <p14:creationId xmlns:p14="http://schemas.microsoft.com/office/powerpoint/2010/main" val="3455206422"/>
+      </p:ext>
+    </p:extLst>
+  </p:cSld>
+  <p:clrMapOvr>
+    <a:masterClrMapping/>
+  </p:clrMapOvr>
+  <p:timing>
+    <p:tnLst>
+      <p:par>
+        <p:cTn id="1" dur="indefinite" restart="never" nodeType="tmRoot">
+          <p:childTnLst>
+            <p:seq concurrent="1" nextAc="seek">
+              <p:cTn id="2" dur="indefinite" nodeType="mainSeq">
+                <p:childTnLst>
+                  <p:par>
+                    <p:cTn id="3" fill="hold">
+                      <p:stCondLst>
+                        <p:cond delay="indefinite"/>
+                        <p:cond evt="onBegin" delay="0">
+                          <p:tn val="2"/>
+                        </p:cond>
+                      </p:stCondLst>
+                      <p:childTnLst>
+                        <p:par>
+                          <p:cTn id="4" fill="hold">
+                            <p:stCondLst>
+                              <p:cond delay="0"/>
+                            </p:stCondLst>
+                            <p:childTnLst>
+                              <p:par>
+                                <p:cTn id="5" presetID="10" presetClass="entr" presetSubtype="0" fill="hold" grpId="0" nodeType="withEffect">
+                                  <p:stCondLst>
+                                    <p:cond delay="500"/>
+                                  </p:stCondLst>
+                                  <p:iterate type="lt">
+                                    <p:tmPct val="10000"/>
+                                  </p:iterate>
+                                  <p:childTnLst>
+                                    <p:set>
+                                      <p:cBhvr>
+                                        <p:cTn id="6" dur="1" fill="hold">
+                                          <p:stCondLst>
+                                            <p:cond delay="0"/>
+                                          </p:stCondLst>
+                                        </p:cTn>
+                                        <p:tgtEl>
+                                          <p:spTgt spid="2"/>
+                                        </p:tgtEl>
+                                        <p:attrNameLst>
+                                          <p:attrName>style.visibility</p:attrName>
+                                        </p:attrNameLst>
+                                      </p:cBhvr>
+                                      <p:to>
+                                        <p:strVal val="visible"/>
+                                      </p:to>
+                                    </p:set>
+                                    <p:animEffect transition="in" filter="fade">
+                                      <p:cBhvr>
+                                        <p:cTn id="7" dur="400"/>
+                                        <p:tgtEl>
+                                          <p:spTgt spid="2"/>
+                                        </p:tgtEl>
+                                      </p:cBhvr>
+                                    </p:animEffect>
+                                  </p:childTnLst>
+                                </p:cTn>
+                              </p:par>
+                            </p:childTnLst>
+                          </p:cTn>
+                        </p:par>
+                      </p:childTnLst>
+                    </p:cTn>
+                  </p:par>
+                </p:childTnLst>
+              </p:cTn>
+              <p:prevCondLst>
+                <p:cond evt="onPrev" delay="0">
+                  <p:tgtEl>
+                    <p:sldTgt/>
+                  </p:tgtEl>
+                </p:cond>
+              </p:prevCondLst>
+              <p:nextCondLst>
+                <p:cond evt="onNext" delay="0">
+                  <p:tgtEl>
+                    <p:sldTgt/>
+                  </p:tgtEl>
+                </p:cond>
+              </p:nextCondLst>
+            </p:seq>
+          </p:childTnLst>
+        </p:cTn>
+      </p:par>
+    </p:tnLst>
+    <p:bldLst>
+      <p:bldP spid="2" grpId="0"/>
+    </p:bldLst>
+  </p:timing>
+</p:sld>
+</file>
+
 <file path=ppt/slides/slide2.xml><?xml version="1.0" encoding="utf-8"?>
+<p:sld xmlns:a="http://schemas.openxmlformats.org/drawingml/2006/main" xmlns:r="http://schemas.openxmlformats.org/officeDocument/2006/relationships" xmlns:p="http://schemas.openxmlformats.org/presentationml/2006/main">
+  <p:cSld>
+    <p:bg>
+      <p:bgPr>
+        <a:solidFill>
+          <a:schemeClr val="bg1"/>
+        </a:solidFill>
+        <a:effectLst/>
+      </p:bgPr>
+    </p:bg>
+    <p:spTree>
+      <p:nvGrpSpPr>
+        <p:cNvPr id="1" name=""/>
+        <p:cNvGrpSpPr/>
+        <p:nvPr/>
+      </p:nvGrpSpPr>
+      <p:grpSpPr>
+        <a:xfrm>
+          <a:off x="0" y="0"/>
+          <a:ext cx="0" cy="0"/>
+          <a:chOff x="0" y="0"/>
+          <a:chExt cx="0" cy="0"/>
+        </a:xfrm>
+      </p:grpSpPr>
+      <p:sp useBgFill="1">
+        <p:nvSpPr>
+          <p:cNvPr id="9" name="Slide Background">
+            <a:extLst>
+              <a:ext uri="{FF2B5EF4-FFF2-40B4-BE49-F238E27FC236}">
+                <a16:creationId xmlns:a16="http://schemas.microsoft.com/office/drawing/2014/main" id="{C0763A76-9F1C-4FC5-82B7-DD475DA461B2}"/>
+              </a:ext>
+              <a:ext uri="{C183D7F6-B498-43B3-948B-1728B52AA6E4}">
+                <adec:decorative xmlns:adec="http://schemas.microsoft.com/office/drawing/2017/decorative" val="1"/>
+              </a:ext>
+            </a:extLst>
+          </p:cNvPr>
+          <p:cNvSpPr>
+            <a:spLocks noGrp="1" noRot="1" noChangeAspect="1" noMove="1" noResize="1" noEditPoints="1" noAdjustHandles="1" noChangeArrowheads="1" noChangeShapeType="1" noTextEdit="1"/>
+          </p:cNvSpPr>
+          <p:nvPr>
+            <p:extLst>
+              <p:ext uri="{386F3935-93C4-4BCD-93E2-E3B085C9AB24}">
+                <p16:designElem xmlns:p16="http://schemas.microsoft.com/office/powerpoint/2015/main" val="1"/>
+              </p:ext>
+            </p:extLst>
+          </p:nvPr>
+        </p:nvSpPr>
+        <p:spPr bwMode="white">
+          <a:xfrm>
+            <a:off x="-1" y="0"/>
+            <a:ext cx="12191999" cy="6858000"/>
+          </a:xfrm>
+          <a:prstGeom prst="rect">
+            <a:avLst/>
+          </a:prstGeom>
+          <a:ln>
+            <a:noFill/>
+          </a:ln>
+        </p:spPr>
+        <p:style>
+          <a:lnRef idx="2">
+            <a:schemeClr val="accent1">
+              <a:shade val="50000"/>
+            </a:schemeClr>
+          </a:lnRef>
+          <a:fillRef idx="1">
+            <a:schemeClr val="accent1"/>
+          </a:fillRef>
+          <a:effectRef idx="0">
+            <a:schemeClr val="accent1"/>
+          </a:effectRef>
+          <a:fontRef idx="minor">
+            <a:schemeClr val="lt1"/>
+          </a:fontRef>
+        </p:style>
+        <p:txBody>
+          <a:bodyPr rtlCol="0" anchor="ctr"/>
+          <a:lstStyle>
+            <a:defPPr>
+              <a:defRPr lang="en-US"/>
+            </a:defPPr>
+            <a:lvl1pPr marL="0" algn="l" defTabSz="914400" rtl="0" eaLnBrk="1" latinLnBrk="0" hangingPunct="1">
+              <a:defRPr sz="1800" kern="1200">
+                <a:solidFill>
+                  <a:schemeClr val="lt1"/>
+                </a:solidFill>
+                <a:latin typeface="+mn-lt"/>
+                <a:ea typeface="+mn-ea"/>
+                <a:cs typeface="+mn-cs"/>
+              </a:defRPr>
+            </a:lvl1pPr>
+            <a:lvl2pPr marL="457200" algn="l" defTabSz="914400" rtl="0" eaLnBrk="1" latinLnBrk="0" hangingPunct="1">
+              <a:defRPr sz="1800" kern="1200">
+                <a:solidFill>
+                  <a:schemeClr val="lt1"/>
+                </a:solidFill>
+                <a:latin typeface="+mn-lt"/>
+                <a:ea typeface="+mn-ea"/>
+                <a:cs typeface="+mn-cs"/>
+              </a:defRPr>
+            </a:lvl2pPr>
+            <a:lvl3pPr marL="914400" algn="l" defTabSz="914400" rtl="0" eaLnBrk="1" latinLnBrk="0" hangingPunct="1">
+              <a:defRPr sz="1800" kern="1200">
+                <a:solidFill>
+                  <a:schemeClr val="lt1"/>
+                </a:solidFill>
+                <a:latin typeface="+mn-lt"/>
+                <a:ea typeface="+mn-ea"/>
+                <a:cs typeface="+mn-cs"/>
+              </a:defRPr>
+            </a:lvl3pPr>
+            <a:lvl4pPr marL="1371600" algn="l" defTabSz="914400" rtl="0" eaLnBrk="1" latinLnBrk="0" hangingPunct="1">
+              <a:defRPr sz="1800" kern="1200">
+                <a:solidFill>
+                  <a:schemeClr val="lt1"/>
+                </a:solidFill>
+                <a:latin typeface="+mn-lt"/>
+                <a:ea typeface="+mn-ea"/>
+                <a:cs typeface="+mn-cs"/>
+              </a:defRPr>
+            </a:lvl4pPr>
+            <a:lvl5pPr marL="1828800" algn="l" defTabSz="914400" rtl="0" eaLnBrk="1" latinLnBrk="0" hangingPunct="1">
+              <a:defRPr sz="1800" kern="1200">
+                <a:solidFill>
+                  <a:schemeClr val="lt1"/>
+                </a:solidFill>
+                <a:latin typeface="+mn-lt"/>
+                <a:ea typeface="+mn-ea"/>
+                <a:cs typeface="+mn-cs"/>
+              </a:defRPr>
+            </a:lvl5pPr>
+            <a:lvl6pPr marL="2286000" algn="l" defTabSz="914400" rtl="0" eaLnBrk="1" latinLnBrk="0" hangingPunct="1">
+              <a:defRPr sz="1800" kern="1200">
+                <a:solidFill>
+                  <a:schemeClr val="lt1"/>
+                </a:solidFill>
+                <a:latin typeface="+mn-lt"/>
+                <a:ea typeface="+mn-ea"/>
+                <a:cs typeface="+mn-cs"/>
+              </a:defRPr>
+            </a:lvl6pPr>
+            <a:lvl7pPr marL="2743200" algn="l" defTabSz="914400" rtl="0" eaLnBrk="1" latinLnBrk="0" hangingPunct="1">
+              <a:defRPr sz="1800" kern="1200">
+                <a:solidFill>
+                  <a:schemeClr val="lt1"/>
+                </a:solidFill>
+                <a:latin typeface="+mn-lt"/>
+                <a:ea typeface="+mn-ea"/>
+                <a:cs typeface="+mn-cs"/>
+              </a:defRPr>
+            </a:lvl7pPr>
+            <a:lvl8pPr marL="3200400" algn="l" defTabSz="914400" rtl="0" eaLnBrk="1" latinLnBrk="0" hangingPunct="1">
+              <a:defRPr sz="1800" kern="1200">
+                <a:solidFill>
+                  <a:schemeClr val="lt1"/>
+                </a:solidFill>
+                <a:latin typeface="+mn-lt"/>
+                <a:ea typeface="+mn-ea"/>
+                <a:cs typeface="+mn-cs"/>
+              </a:defRPr>
+            </a:lvl8pPr>
+            <a:lvl9pPr marL="3657600" algn="l" defTabSz="914400" rtl="0" eaLnBrk="1" latinLnBrk="0" hangingPunct="1">
+              <a:defRPr sz="1800" kern="1200">
+                <a:solidFill>
+                  <a:schemeClr val="lt1"/>
+                </a:solidFill>
+                <a:latin typeface="+mn-lt"/>
+                <a:ea typeface="+mn-ea"/>
+                <a:cs typeface="+mn-cs"/>
+              </a:defRPr>
+            </a:lvl9pPr>
+          </a:lstStyle>
+          <a:p>
+            <a:pPr algn="ctr"/>
+            <a:endParaRPr lang="en-US"/>
+          </a:p>
+        </p:txBody>
+      </p:sp>
+      <p:sp useBgFill="1">
+        <p:nvSpPr>
+          <p:cNvPr id="11" name="Rectangle 10">
+            <a:extLst>
+              <a:ext uri="{FF2B5EF4-FFF2-40B4-BE49-F238E27FC236}">
+                <a16:creationId xmlns:a16="http://schemas.microsoft.com/office/drawing/2014/main" id="{E81BF4F6-F2CF-4984-9D14-D6966D92F99F}"/>
+              </a:ext>
+              <a:ext uri="{C183D7F6-B498-43B3-948B-1728B52AA6E4}">
+                <adec:decorative xmlns:adec="http://schemas.microsoft.com/office/drawing/2017/decorative" val="1"/>
+              </a:ext>
+            </a:extLst>
+          </p:cNvPr>
+          <p:cNvSpPr>
+            <a:spLocks noGrp="1" noRot="1" noChangeAspect="1" noMove="1" noResize="1" noEditPoints="1" noAdjustHandles="1" noChangeArrowheads="1" noChangeShapeType="1" noTextEdit="1"/>
+          </p:cNvSpPr>
+          <p:nvPr>
+            <p:extLst>
+              <p:ext uri="{386F3935-93C4-4BCD-93E2-E3B085C9AB24}">
+                <p16:designElem xmlns:p16="http://schemas.microsoft.com/office/powerpoint/2015/main" val="1"/>
+              </p:ext>
+            </p:extLst>
+          </p:nvPr>
+        </p:nvSpPr>
+        <p:spPr>
+          <a:xfrm>
+            <a:off x="1" y="0"/>
+            <a:ext cx="8522446" cy="2285999"/>
+          </a:xfrm>
+          <a:prstGeom prst="rect">
+            <a:avLst/>
+          </a:prstGeom>
+          <a:ln>
+            <a:noFill/>
+          </a:ln>
+          <a:effectLst>
+            <a:outerShdw blurRad="596900" dist="304800" dir="7140000" sx="90000" sy="90000" algn="t" rotWithShape="0">
+              <a:srgbClr val="000000">
+                <a:alpha val="15000"/>
+              </a:srgbClr>
+            </a:outerShdw>
+          </a:effectLst>
+        </p:spPr>
+        <p:style>
+          <a:lnRef idx="2">
+            <a:schemeClr val="accent1">
+              <a:shade val="50000"/>
+            </a:schemeClr>
+          </a:lnRef>
+          <a:fillRef idx="1">
+            <a:schemeClr val="accent1"/>
+          </a:fillRef>
+          <a:effectRef idx="0">
+            <a:schemeClr val="accent1"/>
+          </a:effectRef>
+          <a:fontRef idx="minor">
+            <a:schemeClr val="lt1"/>
+          </a:fontRef>
+        </p:style>
+        <p:txBody>
+          <a:bodyPr rtlCol="0" anchor="ctr"/>
+          <a:lstStyle/>
+          <a:p>
+            <a:pPr algn="ctr"/>
+            <a:endParaRPr lang="en-US"/>
+          </a:p>
+        </p:txBody>
+      </p:sp>
+      <p:sp>
+        <p:nvSpPr>
+          <p:cNvPr id="2" name="Title 1">
+            <a:extLst>
+              <a:ext uri="{FF2B5EF4-FFF2-40B4-BE49-F238E27FC236}">
+                <a16:creationId xmlns:a16="http://schemas.microsoft.com/office/drawing/2014/main" id="{E3C58C06-6893-5F45-35FE-C98F1E71B483}"/>
+              </a:ext>
+            </a:extLst>
+          </p:cNvPr>
+          <p:cNvSpPr>
+            <a:spLocks noGrp="1"/>
+          </p:cNvSpPr>
+          <p:nvPr>
+            <p:ph type="title"/>
+          </p:nvPr>
+        </p:nvSpPr>
+        <p:spPr>
+          <a:xfrm>
+            <a:off x="761803" y="350196"/>
+            <a:ext cx="4646904" cy="1624520"/>
+          </a:xfrm>
+        </p:spPr>
+        <p:txBody>
+          <a:bodyPr anchor="ctr">
+            <a:normAutofit/>
+          </a:bodyPr>
+          <a:lstStyle/>
+          <a:p>
+            <a:pPr algn="ctr"/>
+            <a:r>
+              <a:rPr lang="en-US" sz="4000" dirty="0"/>
+              <a:t>Thesis</a:t>
+            </a:r>
+          </a:p>
+        </p:txBody>
+      </p:sp>
+      <p:sp>
+        <p:nvSpPr>
+          <p:cNvPr id="3" name="Content Placeholder 2">
+            <a:extLst>
+              <a:ext uri="{FF2B5EF4-FFF2-40B4-BE49-F238E27FC236}">
+                <a16:creationId xmlns:a16="http://schemas.microsoft.com/office/drawing/2014/main" id="{A5239EAE-D936-1A91-1CA0-54BF1DD02FB1}"/>
+              </a:ext>
+            </a:extLst>
+          </p:cNvPr>
+          <p:cNvSpPr>
+            <a:spLocks noGrp="1"/>
+          </p:cNvSpPr>
+          <p:nvPr>
+            <p:ph idx="1"/>
+          </p:nvPr>
+        </p:nvSpPr>
+        <p:spPr>
+          <a:xfrm>
+            <a:off x="-6828" y="2286000"/>
+            <a:ext cx="6096001" cy="4572000"/>
+          </a:xfrm>
+        </p:spPr>
+        <p:txBody>
+          <a:bodyPr anchor="ctr">
+            <a:normAutofit/>
+          </a:bodyPr>
+          <a:lstStyle/>
+          <a:p>
+            <a:pPr marL="0" indent="0" algn="ctr">
+              <a:buNone/>
+            </a:pPr>
+            <a:r>
+              <a:rPr lang="en-US" sz="2400" dirty="0"/>
+              <a:t>Our study will analyze the sales performance of video games across genres and platforms through different regions, identifying shifts in genre and platform popularity and their correlation with the regions they are sold in.</a:t>
+            </a:r>
+          </a:p>
+        </p:txBody>
+      </p:sp>
+      <p:pic>
+        <p:nvPicPr>
+          <p:cNvPr id="5" name="Picture 4" descr="Gadgets on a desk">
+            <a:extLst>
+              <a:ext uri="{FF2B5EF4-FFF2-40B4-BE49-F238E27FC236}">
+                <a16:creationId xmlns:a16="http://schemas.microsoft.com/office/drawing/2014/main" id="{B9EBDA7A-0003-A4C8-6114-D28A7F26A735}"/>
+              </a:ext>
+            </a:extLst>
+          </p:cNvPr>
+          <p:cNvPicPr>
+            <a:picLocks noChangeAspect="1"/>
+          </p:cNvPicPr>
+          <p:nvPr/>
+        </p:nvPicPr>
+        <p:blipFill>
+          <a:blip r:embed="rId2"/>
+          <a:srcRect l="7518" r="25740"/>
+          <a:stretch/>
+        </p:blipFill>
+        <p:spPr>
+          <a:xfrm>
+            <a:off x="6096000" y="1"/>
+            <a:ext cx="6102825" cy="6858000"/>
+          </a:xfrm>
+          <a:prstGeom prst="rect">
+            <a:avLst/>
+          </a:prstGeom>
+        </p:spPr>
+      </p:pic>
+    </p:spTree>
+    <p:extLst>
+      <p:ext uri="{BB962C8B-B14F-4D97-AF65-F5344CB8AC3E}">
+        <p14:creationId xmlns:p14="http://schemas.microsoft.com/office/powerpoint/2010/main" val="3283804103"/>
+      </p:ext>
+    </p:extLst>
+  </p:cSld>
+  <p:clrMapOvr>
+    <a:masterClrMapping/>
+  </p:clrMapOvr>
+</p:sld>
+</file>
+
+<file path=ppt/slides/slide3.xml><?xml version="1.0" encoding="utf-8"?>
 <p:sld xmlns:a="http://schemas.openxmlformats.org/drawingml/2006/main" xmlns:r="http://schemas.openxmlformats.org/officeDocument/2006/relationships" xmlns:p="http://schemas.openxmlformats.org/presentationml/2006/main">
   <p:cSld>
     <p:bg>
@@ -17403,7 +20524,7 @@
 </p:sld>
 </file>
 
-<file path=ppt/slides/slide3.xml><?xml version="1.0" encoding="utf-8"?>
+<file path=ppt/slides/slide4.xml><?xml version="1.0" encoding="utf-8"?>
 <p:sld xmlns:a="http://schemas.openxmlformats.org/drawingml/2006/main" xmlns:r="http://schemas.openxmlformats.org/officeDocument/2006/relationships" xmlns:p="http://schemas.openxmlformats.org/presentationml/2006/main">
   <p:cSld>
     <p:bg>
@@ -17537,7 +20658,7 @@
 </p:sld>
 </file>
 
-<file path=ppt/slides/slide4.xml><?xml version="1.0" encoding="utf-8"?>
+<file path=ppt/slides/slide5.xml><?xml version="1.0" encoding="utf-8"?>
 <p:sld xmlns:a="http://schemas.openxmlformats.org/drawingml/2006/main" xmlns:r="http://schemas.openxmlformats.org/officeDocument/2006/relationships" xmlns:p="http://schemas.openxmlformats.org/presentationml/2006/main">
   <p:cSld>
     <p:bg>
@@ -18010,7 +21131,7 @@
 </p:sld>
 </file>
 
-<file path=ppt/slides/slide5.xml><?xml version="1.0" encoding="utf-8"?>
+<file path=ppt/slides/slide6.xml><?xml version="1.0" encoding="utf-8"?>
 <p:sld xmlns:a="http://schemas.openxmlformats.org/drawingml/2006/main" xmlns:r="http://schemas.openxmlformats.org/officeDocument/2006/relationships" xmlns:p="http://schemas.openxmlformats.org/presentationml/2006/main">
   <p:cSld>
     <p:bg>
@@ -18845,7 +21966,7 @@
 </p:sld>
 </file>
 
-<file path=ppt/slides/slide6.xml><?xml version="1.0" encoding="utf-8"?>
+<file path=ppt/slides/slide7.xml><?xml version="1.0" encoding="utf-8"?>
 <p:sld xmlns:a="http://schemas.openxmlformats.org/drawingml/2006/main" xmlns:r="http://schemas.openxmlformats.org/officeDocument/2006/relationships" xmlns:p="http://schemas.openxmlformats.org/presentationml/2006/main">
   <p:cSld>
     <p:bg>
@@ -18979,7 +22100,7 @@
 </p:sld>
 </file>
 
-<file path=ppt/slides/slide7.xml><?xml version="1.0" encoding="utf-8"?>
+<file path=ppt/slides/slide8.xml><?xml version="1.0" encoding="utf-8"?>
 <p:sld xmlns:a="http://schemas.openxmlformats.org/drawingml/2006/main" xmlns:r="http://schemas.openxmlformats.org/officeDocument/2006/relationships" xmlns:p="http://schemas.openxmlformats.org/presentationml/2006/main">
   <p:cSld>
     <p:bg>
@@ -19452,7 +22573,7 @@
 </p:sld>
 </file>
 
-<file path=ppt/slides/slide8.xml><?xml version="1.0" encoding="utf-8"?>
+<file path=ppt/slides/slide9.xml><?xml version="1.0" encoding="utf-8"?>
 <p:sld xmlns:a="http://schemas.openxmlformats.org/drawingml/2006/main" xmlns:r="http://schemas.openxmlformats.org/officeDocument/2006/relationships" xmlns:p="http://schemas.openxmlformats.org/presentationml/2006/main">
   <p:cSld>
     <p:bg>
@@ -20278,295 +23399,6 @@
     <p:extLst>
       <p:ext uri="{BB962C8B-B14F-4D97-AF65-F5344CB8AC3E}">
         <p14:creationId xmlns:p14="http://schemas.microsoft.com/office/powerpoint/2010/main" val="2868337354"/>
-      </p:ext>
-    </p:extLst>
-  </p:cSld>
-  <p:clrMapOvr>
-    <a:masterClrMapping/>
-  </p:clrMapOvr>
-</p:sld>
-</file>
-
-<file path=ppt/slides/slide9.xml><?xml version="1.0" encoding="utf-8"?>
-<p:sld xmlns:a="http://schemas.openxmlformats.org/drawingml/2006/main" xmlns:r="http://schemas.openxmlformats.org/officeDocument/2006/relationships" xmlns:p="http://schemas.openxmlformats.org/presentationml/2006/main">
-  <p:cSld>
-    <p:bg>
-      <p:bgPr>
-        <a:solidFill>
-          <a:schemeClr val="bg1"/>
-        </a:solidFill>
-        <a:effectLst/>
-      </p:bgPr>
-    </p:bg>
-    <p:spTree>
-      <p:nvGrpSpPr>
-        <p:cNvPr id="1" name=""/>
-        <p:cNvGrpSpPr/>
-        <p:nvPr/>
-      </p:nvGrpSpPr>
-      <p:grpSpPr>
-        <a:xfrm>
-          <a:off x="0" y="0"/>
-          <a:ext cx="0" cy="0"/>
-          <a:chOff x="0" y="0"/>
-          <a:chExt cx="0" cy="0"/>
-        </a:xfrm>
-      </p:grpSpPr>
-      <p:pic>
-        <p:nvPicPr>
-          <p:cNvPr id="5" name="Picture 4" descr="A map of the world with different colored circles&#10;&#10;Description automatically generated">
-            <a:extLst>
-              <a:ext uri="{FF2B5EF4-FFF2-40B4-BE49-F238E27FC236}">
-                <a16:creationId xmlns:a16="http://schemas.microsoft.com/office/drawing/2014/main" id="{ACFEB7CC-F3BC-979B-955A-7429B5383098}"/>
-              </a:ext>
-            </a:extLst>
-          </p:cNvPr>
-          <p:cNvPicPr>
-            <a:picLocks noChangeAspect="1"/>
-          </p:cNvPicPr>
-          <p:nvPr/>
-        </p:nvPicPr>
-        <p:blipFill>
-          <a:blip r:embed="rId2">
-            <a:extLst>
-              <a:ext uri="{28A0092B-C50C-407E-A947-70E740481C1C}">
-                <a14:useLocalDpi xmlns:a14="http://schemas.microsoft.com/office/drawing/2010/main" val="0"/>
-              </a:ext>
-            </a:extLst>
-          </a:blip>
-          <a:srcRect b="6250"/>
-          <a:stretch/>
-        </p:blipFill>
-        <p:spPr>
-          <a:xfrm>
-            <a:off x="20" y="10"/>
-            <a:ext cx="12191980" cy="6857990"/>
-          </a:xfrm>
-          <a:prstGeom prst="rect">
-            <a:avLst/>
-          </a:prstGeom>
-        </p:spPr>
-      </p:pic>
-      <p:sp>
-        <p:nvSpPr>
-          <p:cNvPr id="10" name="Rectangle 9">
-            <a:extLst>
-              <a:ext uri="{FF2B5EF4-FFF2-40B4-BE49-F238E27FC236}">
-                <a16:creationId xmlns:a16="http://schemas.microsoft.com/office/drawing/2014/main" id="{37C89E4B-3C9F-44B9-8B86-D9E3D112D8EC}"/>
-              </a:ext>
-              <a:ext uri="{C183D7F6-B498-43B3-948B-1728B52AA6E4}">
-                <adec:decorative xmlns:adec="http://schemas.microsoft.com/office/drawing/2017/decorative" val="1"/>
-              </a:ext>
-            </a:extLst>
-          </p:cNvPr>
-          <p:cNvSpPr>
-            <a:spLocks noGrp="1" noRot="1" noChangeAspect="1" noMove="1" noResize="1" noEditPoints="1" noAdjustHandles="1" noChangeArrowheads="1" noChangeShapeType="1" noTextEdit="1"/>
-          </p:cNvSpPr>
-          <p:nvPr>
-            <p:extLst>
-              <p:ext uri="{386F3935-93C4-4BCD-93E2-E3B085C9AB24}">
-                <p16:designElem xmlns:p16="http://schemas.microsoft.com/office/powerpoint/2015/main" val="1"/>
-              </p:ext>
-            </p:extLst>
-          </p:nvPr>
-        </p:nvSpPr>
-        <p:spPr>
-          <a:xfrm>
-            <a:off x="0" y="5320142"/>
-            <a:ext cx="12192000" cy="736551"/>
-          </a:xfrm>
-          <a:prstGeom prst="rect">
-            <a:avLst/>
-          </a:prstGeom>
-          <a:solidFill>
-            <a:schemeClr val="bg1">
-              <a:alpha val="93000"/>
-            </a:schemeClr>
-          </a:solidFill>
-          <a:ln>
-            <a:noFill/>
-          </a:ln>
-        </p:spPr>
-        <p:style>
-          <a:lnRef idx="2">
-            <a:schemeClr val="accent1">
-              <a:shade val="50000"/>
-            </a:schemeClr>
-          </a:lnRef>
-          <a:fillRef idx="1">
-            <a:schemeClr val="accent1"/>
-          </a:fillRef>
-          <a:effectRef idx="0">
-            <a:schemeClr val="accent1"/>
-          </a:effectRef>
-          <a:fontRef idx="minor">
-            <a:schemeClr val="lt1"/>
-          </a:fontRef>
-        </p:style>
-        <p:txBody>
-          <a:bodyPr rtlCol="0" anchor="ctr"/>
-          <a:lstStyle/>
-          <a:p>
-            <a:pPr algn="ctr"/>
-            <a:endParaRPr lang="en-US"/>
-          </a:p>
-        </p:txBody>
-      </p:sp>
-      <p:sp>
-        <p:nvSpPr>
-          <p:cNvPr id="2" name="Title 1">
-            <a:extLst>
-              <a:ext uri="{FF2B5EF4-FFF2-40B4-BE49-F238E27FC236}">
-                <a16:creationId xmlns:a16="http://schemas.microsoft.com/office/drawing/2014/main" id="{4E504FAE-863F-774B-CAA7-525E98276E0F}"/>
-              </a:ext>
-            </a:extLst>
-          </p:cNvPr>
-          <p:cNvSpPr>
-            <a:spLocks noGrp="1"/>
-          </p:cNvSpPr>
-          <p:nvPr>
-            <p:ph type="title"/>
-          </p:nvPr>
-        </p:nvSpPr>
-        <p:spPr>
-          <a:xfrm>
-            <a:off x="523875" y="5317240"/>
-            <a:ext cx="11210925" cy="744836"/>
-          </a:xfrm>
-        </p:spPr>
-        <p:txBody>
-          <a:bodyPr vert="horz" lIns="91440" tIns="45720" rIns="91440" bIns="45720" rtlCol="0" anchor="ctr">
-            <a:normAutofit/>
-          </a:bodyPr>
-          <a:lstStyle/>
-          <a:p>
-            <a:pPr algn="ctr"/>
-            <a:r>
-              <a:rPr lang="en-US" sz="3600" dirty="0">
-                <a:solidFill>
-                  <a:schemeClr val="tx1">
-                    <a:lumMod val="85000"/>
-                    <a:lumOff val="15000"/>
-                  </a:schemeClr>
-                </a:solidFill>
-              </a:rPr>
-              <a:t>Action</a:t>
-            </a:r>
-          </a:p>
-        </p:txBody>
-      </p:sp>
-      <p:cxnSp>
-        <p:nvCxnSpPr>
-          <p:cNvPr id="12" name="Straight Connector 11">
-            <a:extLst>
-              <a:ext uri="{FF2B5EF4-FFF2-40B4-BE49-F238E27FC236}">
-                <a16:creationId xmlns:a16="http://schemas.microsoft.com/office/drawing/2014/main" id="{AA2EAA10-076F-46BD-8F0F-B9A2FB77A85C}"/>
-              </a:ext>
-              <a:ext uri="{C183D7F6-B498-43B3-948B-1728B52AA6E4}">
-                <adec:decorative xmlns:adec="http://schemas.microsoft.com/office/drawing/2017/decorative" val="1"/>
-              </a:ext>
-            </a:extLst>
-          </p:cNvPr>
-          <p:cNvCxnSpPr>
-            <a:cxnSpLocks noGrp="1" noRot="1" noChangeAspect="1" noMove="1" noResize="1" noEditPoints="1" noAdjustHandles="1" noChangeArrowheads="1" noChangeShapeType="1"/>
-          </p:cNvCxnSpPr>
-          <p:nvPr>
-            <p:extLst>
-              <p:ext uri="{386F3935-93C4-4BCD-93E2-E3B085C9AB24}">
-                <p16:designElem xmlns:p16="http://schemas.microsoft.com/office/powerpoint/2015/main" val="1"/>
-              </p:ext>
-            </p:extLst>
-          </p:nvPr>
-        </p:nvCxnSpPr>
-        <p:spPr>
-          <a:xfrm>
-            <a:off x="0" y="5241983"/>
-            <a:ext cx="12192000" cy="0"/>
-          </a:xfrm>
-          <a:prstGeom prst="line">
-            <a:avLst/>
-          </a:prstGeom>
-          <a:ln w="41275">
-            <a:solidFill>
-              <a:schemeClr val="bg1">
-                <a:alpha val="90000"/>
-              </a:schemeClr>
-            </a:solidFill>
-          </a:ln>
-        </p:spPr>
-        <p:style>
-          <a:lnRef idx="1">
-            <a:schemeClr val="accent1"/>
-          </a:lnRef>
-          <a:fillRef idx="0">
-            <a:schemeClr val="accent1"/>
-          </a:fillRef>
-          <a:effectRef idx="0">
-            <a:schemeClr val="accent1"/>
-          </a:effectRef>
-          <a:fontRef idx="minor">
-            <a:schemeClr val="tx1"/>
-          </a:fontRef>
-        </p:style>
-      </p:cxnSp>
-      <p:cxnSp>
-        <p:nvCxnSpPr>
-          <p:cNvPr id="14" name="Straight Connector 13">
-            <a:extLst>
-              <a:ext uri="{FF2B5EF4-FFF2-40B4-BE49-F238E27FC236}">
-                <a16:creationId xmlns:a16="http://schemas.microsoft.com/office/drawing/2014/main" id="{D891E407-403B-4764-86C9-33A56D3BCAA3}"/>
-              </a:ext>
-              <a:ext uri="{C183D7F6-B498-43B3-948B-1728B52AA6E4}">
-                <adec:decorative xmlns:adec="http://schemas.microsoft.com/office/drawing/2017/decorative" val="1"/>
-              </a:ext>
-            </a:extLst>
-          </p:cNvPr>
-          <p:cNvCxnSpPr>
-            <a:cxnSpLocks noGrp="1" noRot="1" noChangeAspect="1" noMove="1" noResize="1" noEditPoints="1" noAdjustHandles="1" noChangeArrowheads="1" noChangeShapeType="1"/>
-          </p:cNvCxnSpPr>
-          <p:nvPr>
-            <p:extLst>
-              <p:ext uri="{386F3935-93C4-4BCD-93E2-E3B085C9AB24}">
-                <p16:designElem xmlns:p16="http://schemas.microsoft.com/office/powerpoint/2015/main" val="1"/>
-              </p:ext>
-            </p:extLst>
-          </p:nvPr>
-        </p:nvCxnSpPr>
-        <p:spPr>
-          <a:xfrm>
-            <a:off x="0" y="6134852"/>
-            <a:ext cx="12192000" cy="0"/>
-          </a:xfrm>
-          <a:prstGeom prst="line">
-            <a:avLst/>
-          </a:prstGeom>
-          <a:ln w="41275">
-            <a:solidFill>
-              <a:schemeClr val="bg1">
-                <a:alpha val="90000"/>
-              </a:schemeClr>
-            </a:solidFill>
-          </a:ln>
-        </p:spPr>
-        <p:style>
-          <a:lnRef idx="1">
-            <a:schemeClr val="accent1"/>
-          </a:lnRef>
-          <a:fillRef idx="0">
-            <a:schemeClr val="accent1"/>
-          </a:fillRef>
-          <a:effectRef idx="0">
-            <a:schemeClr val="accent1"/>
-          </a:effectRef>
-          <a:fontRef idx="minor">
-            <a:schemeClr val="tx1"/>
-          </a:fontRef>
-        </p:style>
-      </p:cxnSp>
-    </p:spTree>
-    <p:extLst>
-      <p:ext uri="{BB962C8B-B14F-4D97-AF65-F5344CB8AC3E}">
-        <p14:creationId xmlns:p14="http://schemas.microsoft.com/office/powerpoint/2010/main" val="2864208696"/>
       </p:ext>
     </p:extLst>
   </p:cSld>

</xml_diff>